<commit_message>
Finished all slides, I think
</commit_message>
<xml_diff>
--- a/GIT vs TFS.pptx
+++ b/GIT vs TFS.pptx
@@ -4,17 +4,24 @@
   <p:sldMasterIdLst>
     <p:sldMasterId id="2147483648" r:id="rId1"/>
   </p:sldMasterIdLst>
+  <p:notesMasterIdLst>
+    <p:notesMasterId r:id="rId16"/>
+  </p:notesMasterIdLst>
   <p:sldIdLst>
     <p:sldId id="256" r:id="rId2"/>
-    <p:sldId id="257" r:id="rId3"/>
-    <p:sldId id="259" r:id="rId4"/>
-    <p:sldId id="260" r:id="rId5"/>
-    <p:sldId id="262" r:id="rId6"/>
-    <p:sldId id="261" r:id="rId7"/>
-    <p:sldId id="264" r:id="rId8"/>
-    <p:sldId id="263" r:id="rId9"/>
-    <p:sldId id="265" r:id="rId10"/>
-    <p:sldId id="258" r:id="rId11"/>
+    <p:sldId id="271" r:id="rId3"/>
+    <p:sldId id="265" r:id="rId4"/>
+    <p:sldId id="257" r:id="rId5"/>
+    <p:sldId id="270" r:id="rId6"/>
+    <p:sldId id="259" r:id="rId7"/>
+    <p:sldId id="260" r:id="rId8"/>
+    <p:sldId id="262" r:id="rId9"/>
+    <p:sldId id="261" r:id="rId10"/>
+    <p:sldId id="267" r:id="rId11"/>
+    <p:sldId id="264" r:id="rId12"/>
+    <p:sldId id="269" r:id="rId13"/>
+    <p:sldId id="266" r:id="rId14"/>
+    <p:sldId id="272" r:id="rId15"/>
   </p:sldIdLst>
   <p:sldSz cx="12192000" cy="6858000"/>
   <p:notesSz cx="6858000" cy="9144000"/>
@@ -119,6 +126,1703 @@
     </p:ext>
   </p:extLst>
 </p:presentation>
+</file>
+
+<file path=ppt/notesMasters/notesMaster1.xml><?xml version="1.0" encoding="utf-8"?>
+<p:notesMaster xmlns:a="http://schemas.openxmlformats.org/drawingml/2006/main" xmlns:r="http://schemas.openxmlformats.org/officeDocument/2006/relationships" xmlns:p="http://schemas.openxmlformats.org/presentationml/2006/main">
+  <p:cSld>
+    <p:bg>
+      <p:bgRef idx="1001">
+        <a:schemeClr val="bg1"/>
+      </p:bgRef>
+    </p:bg>
+    <p:spTree>
+      <p:nvGrpSpPr>
+        <p:cNvPr id="1" name=""/>
+        <p:cNvGrpSpPr/>
+        <p:nvPr/>
+      </p:nvGrpSpPr>
+      <p:grpSpPr>
+        <a:xfrm>
+          <a:off x="0" y="0"/>
+          <a:ext cx="0" cy="0"/>
+          <a:chOff x="0" y="0"/>
+          <a:chExt cx="0" cy="0"/>
+        </a:xfrm>
+      </p:grpSpPr>
+      <p:sp>
+        <p:nvSpPr>
+          <p:cNvPr id="2" name="Header Placeholder 1"/>
+          <p:cNvSpPr>
+            <a:spLocks noGrp="1"/>
+          </p:cNvSpPr>
+          <p:nvPr>
+            <p:ph type="hdr" sz="quarter"/>
+          </p:nvPr>
+        </p:nvSpPr>
+        <p:spPr>
+          <a:xfrm>
+            <a:off x="0" y="0"/>
+            <a:ext cx="2971800" cy="458788"/>
+          </a:xfrm>
+          <a:prstGeom prst="rect">
+            <a:avLst/>
+          </a:prstGeom>
+        </p:spPr>
+        <p:txBody>
+          <a:bodyPr vert="horz" lIns="91440" tIns="45720" rIns="91440" bIns="45720" rtlCol="0"/>
+          <a:lstStyle>
+            <a:lvl1pPr algn="l">
+              <a:defRPr sz="1200"/>
+            </a:lvl1pPr>
+          </a:lstStyle>
+          <a:p>
+            <a:endParaRPr lang="nb-NO"/>
+          </a:p>
+        </p:txBody>
+      </p:sp>
+      <p:sp>
+        <p:nvSpPr>
+          <p:cNvPr id="3" name="Date Placeholder 2"/>
+          <p:cNvSpPr>
+            <a:spLocks noGrp="1"/>
+          </p:cNvSpPr>
+          <p:nvPr>
+            <p:ph type="dt" idx="1"/>
+          </p:nvPr>
+        </p:nvSpPr>
+        <p:spPr>
+          <a:xfrm>
+            <a:off x="3884613" y="0"/>
+            <a:ext cx="2971800" cy="458788"/>
+          </a:xfrm>
+          <a:prstGeom prst="rect">
+            <a:avLst/>
+          </a:prstGeom>
+        </p:spPr>
+        <p:txBody>
+          <a:bodyPr vert="horz" lIns="91440" tIns="45720" rIns="91440" bIns="45720" rtlCol="0"/>
+          <a:lstStyle>
+            <a:lvl1pPr algn="r">
+              <a:defRPr sz="1200"/>
+            </a:lvl1pPr>
+          </a:lstStyle>
+          <a:p>
+            <a:fld id="{85E6B78F-38D5-4D08-B3C7-8CC3CC232156}" type="datetimeFigureOut">
+              <a:rPr lang="nb-NO" smtClean="0"/>
+              <a:t>22.11.2018</a:t>
+            </a:fld>
+            <a:endParaRPr lang="nb-NO"/>
+          </a:p>
+        </p:txBody>
+      </p:sp>
+      <p:sp>
+        <p:nvSpPr>
+          <p:cNvPr id="4" name="Slide Image Placeholder 3"/>
+          <p:cNvSpPr>
+            <a:spLocks noGrp="1" noRot="1" noChangeAspect="1"/>
+          </p:cNvSpPr>
+          <p:nvPr>
+            <p:ph type="sldImg" idx="2"/>
+          </p:nvPr>
+        </p:nvSpPr>
+        <p:spPr>
+          <a:xfrm>
+            <a:off x="685800" y="1143000"/>
+            <a:ext cx="5486400" cy="3086100"/>
+          </a:xfrm>
+          <a:prstGeom prst="rect">
+            <a:avLst/>
+          </a:prstGeom>
+          <a:noFill/>
+          <a:ln w="12700">
+            <a:solidFill>
+              <a:prstClr val="black"/>
+            </a:solidFill>
+          </a:ln>
+        </p:spPr>
+        <p:txBody>
+          <a:bodyPr vert="horz" lIns="91440" tIns="45720" rIns="91440" bIns="45720" rtlCol="0" anchor="ctr"/>
+          <a:lstStyle/>
+          <a:p>
+            <a:endParaRPr lang="nb-NO"/>
+          </a:p>
+        </p:txBody>
+      </p:sp>
+      <p:sp>
+        <p:nvSpPr>
+          <p:cNvPr id="5" name="Notes Placeholder 4"/>
+          <p:cNvSpPr>
+            <a:spLocks noGrp="1"/>
+          </p:cNvSpPr>
+          <p:nvPr>
+            <p:ph type="body" sz="quarter" idx="3"/>
+          </p:nvPr>
+        </p:nvSpPr>
+        <p:spPr>
+          <a:xfrm>
+            <a:off x="685800" y="4400550"/>
+            <a:ext cx="5486400" cy="3600450"/>
+          </a:xfrm>
+          <a:prstGeom prst="rect">
+            <a:avLst/>
+          </a:prstGeom>
+        </p:spPr>
+        <p:txBody>
+          <a:bodyPr vert="horz" lIns="91440" tIns="45720" rIns="91440" bIns="45720" rtlCol="0"/>
+          <a:lstStyle/>
+          <a:p>
+            <a:pPr lvl="0"/>
+            <a:r>
+              <a:rPr lang="en-US"/>
+              <a:t>Edit Master text styles</a:t>
+            </a:r>
+          </a:p>
+          <a:p>
+            <a:pPr lvl="1"/>
+            <a:r>
+              <a:rPr lang="en-US"/>
+              <a:t>Second level</a:t>
+            </a:r>
+          </a:p>
+          <a:p>
+            <a:pPr lvl="2"/>
+            <a:r>
+              <a:rPr lang="en-US"/>
+              <a:t>Third level</a:t>
+            </a:r>
+          </a:p>
+          <a:p>
+            <a:pPr lvl="3"/>
+            <a:r>
+              <a:rPr lang="en-US"/>
+              <a:t>Fourth level</a:t>
+            </a:r>
+          </a:p>
+          <a:p>
+            <a:pPr lvl="4"/>
+            <a:r>
+              <a:rPr lang="en-US"/>
+              <a:t>Fifth level</a:t>
+            </a:r>
+            <a:endParaRPr lang="nb-NO"/>
+          </a:p>
+        </p:txBody>
+      </p:sp>
+      <p:sp>
+        <p:nvSpPr>
+          <p:cNvPr id="6" name="Footer Placeholder 5"/>
+          <p:cNvSpPr>
+            <a:spLocks noGrp="1"/>
+          </p:cNvSpPr>
+          <p:nvPr>
+            <p:ph type="ftr" sz="quarter" idx="4"/>
+          </p:nvPr>
+        </p:nvSpPr>
+        <p:spPr>
+          <a:xfrm>
+            <a:off x="0" y="8685213"/>
+            <a:ext cx="2971800" cy="458787"/>
+          </a:xfrm>
+          <a:prstGeom prst="rect">
+            <a:avLst/>
+          </a:prstGeom>
+        </p:spPr>
+        <p:txBody>
+          <a:bodyPr vert="horz" lIns="91440" tIns="45720" rIns="91440" bIns="45720" rtlCol="0" anchor="b"/>
+          <a:lstStyle>
+            <a:lvl1pPr algn="l">
+              <a:defRPr sz="1200"/>
+            </a:lvl1pPr>
+          </a:lstStyle>
+          <a:p>
+            <a:endParaRPr lang="nb-NO"/>
+          </a:p>
+        </p:txBody>
+      </p:sp>
+      <p:sp>
+        <p:nvSpPr>
+          <p:cNvPr id="7" name="Slide Number Placeholder 6"/>
+          <p:cNvSpPr>
+            <a:spLocks noGrp="1"/>
+          </p:cNvSpPr>
+          <p:nvPr>
+            <p:ph type="sldNum" sz="quarter" idx="5"/>
+          </p:nvPr>
+        </p:nvSpPr>
+        <p:spPr>
+          <a:xfrm>
+            <a:off x="3884613" y="8685213"/>
+            <a:ext cx="2971800" cy="458787"/>
+          </a:xfrm>
+          <a:prstGeom prst="rect">
+            <a:avLst/>
+          </a:prstGeom>
+        </p:spPr>
+        <p:txBody>
+          <a:bodyPr vert="horz" lIns="91440" tIns="45720" rIns="91440" bIns="45720" rtlCol="0" anchor="b"/>
+          <a:lstStyle>
+            <a:lvl1pPr algn="r">
+              <a:defRPr sz="1200"/>
+            </a:lvl1pPr>
+          </a:lstStyle>
+          <a:p>
+            <a:fld id="{0DB4DFF7-1581-4E3B-BF7C-6E7C7A791C1B}" type="slidenum">
+              <a:rPr lang="nb-NO" smtClean="0"/>
+              <a:t>‹#›</a:t>
+            </a:fld>
+            <a:endParaRPr lang="nb-NO"/>
+          </a:p>
+        </p:txBody>
+      </p:sp>
+    </p:spTree>
+    <p:extLst>
+      <p:ext uri="{BB962C8B-B14F-4D97-AF65-F5344CB8AC3E}">
+        <p14:creationId xmlns:p14="http://schemas.microsoft.com/office/powerpoint/2010/main" val="2339029151"/>
+      </p:ext>
+    </p:extLst>
+  </p:cSld>
+  <p:clrMap bg1="lt1" tx1="dk1" bg2="lt2" tx2="dk2" accent1="accent1" accent2="accent2" accent3="accent3" accent4="accent4" accent5="accent5" accent6="accent6" hlink="hlink" folHlink="folHlink"/>
+  <p:notesStyle>
+    <a:lvl1pPr marL="0" algn="l" defTabSz="914400" rtl="0" eaLnBrk="1" latinLnBrk="0" hangingPunct="1">
+      <a:defRPr sz="1200" kern="1200">
+        <a:solidFill>
+          <a:schemeClr val="tx1"/>
+        </a:solidFill>
+        <a:latin typeface="+mn-lt"/>
+        <a:ea typeface="+mn-ea"/>
+        <a:cs typeface="+mn-cs"/>
+      </a:defRPr>
+    </a:lvl1pPr>
+    <a:lvl2pPr marL="457200" algn="l" defTabSz="914400" rtl="0" eaLnBrk="1" latinLnBrk="0" hangingPunct="1">
+      <a:defRPr sz="1200" kern="1200">
+        <a:solidFill>
+          <a:schemeClr val="tx1"/>
+        </a:solidFill>
+        <a:latin typeface="+mn-lt"/>
+        <a:ea typeface="+mn-ea"/>
+        <a:cs typeface="+mn-cs"/>
+      </a:defRPr>
+    </a:lvl2pPr>
+    <a:lvl3pPr marL="914400" algn="l" defTabSz="914400" rtl="0" eaLnBrk="1" latinLnBrk="0" hangingPunct="1">
+      <a:defRPr sz="1200" kern="1200">
+        <a:solidFill>
+          <a:schemeClr val="tx1"/>
+        </a:solidFill>
+        <a:latin typeface="+mn-lt"/>
+        <a:ea typeface="+mn-ea"/>
+        <a:cs typeface="+mn-cs"/>
+      </a:defRPr>
+    </a:lvl3pPr>
+    <a:lvl4pPr marL="1371600" algn="l" defTabSz="914400" rtl="0" eaLnBrk="1" latinLnBrk="0" hangingPunct="1">
+      <a:defRPr sz="1200" kern="1200">
+        <a:solidFill>
+          <a:schemeClr val="tx1"/>
+        </a:solidFill>
+        <a:latin typeface="+mn-lt"/>
+        <a:ea typeface="+mn-ea"/>
+        <a:cs typeface="+mn-cs"/>
+      </a:defRPr>
+    </a:lvl4pPr>
+    <a:lvl5pPr marL="1828800" algn="l" defTabSz="914400" rtl="0" eaLnBrk="1" latinLnBrk="0" hangingPunct="1">
+      <a:defRPr sz="1200" kern="1200">
+        <a:solidFill>
+          <a:schemeClr val="tx1"/>
+        </a:solidFill>
+        <a:latin typeface="+mn-lt"/>
+        <a:ea typeface="+mn-ea"/>
+        <a:cs typeface="+mn-cs"/>
+      </a:defRPr>
+    </a:lvl5pPr>
+    <a:lvl6pPr marL="2286000" algn="l" defTabSz="914400" rtl="0" eaLnBrk="1" latinLnBrk="0" hangingPunct="1">
+      <a:defRPr sz="1200" kern="1200">
+        <a:solidFill>
+          <a:schemeClr val="tx1"/>
+        </a:solidFill>
+        <a:latin typeface="+mn-lt"/>
+        <a:ea typeface="+mn-ea"/>
+        <a:cs typeface="+mn-cs"/>
+      </a:defRPr>
+    </a:lvl6pPr>
+    <a:lvl7pPr marL="2743200" algn="l" defTabSz="914400" rtl="0" eaLnBrk="1" latinLnBrk="0" hangingPunct="1">
+      <a:defRPr sz="1200" kern="1200">
+        <a:solidFill>
+          <a:schemeClr val="tx1"/>
+        </a:solidFill>
+        <a:latin typeface="+mn-lt"/>
+        <a:ea typeface="+mn-ea"/>
+        <a:cs typeface="+mn-cs"/>
+      </a:defRPr>
+    </a:lvl7pPr>
+    <a:lvl8pPr marL="3200400" algn="l" defTabSz="914400" rtl="0" eaLnBrk="1" latinLnBrk="0" hangingPunct="1">
+      <a:defRPr sz="1200" kern="1200">
+        <a:solidFill>
+          <a:schemeClr val="tx1"/>
+        </a:solidFill>
+        <a:latin typeface="+mn-lt"/>
+        <a:ea typeface="+mn-ea"/>
+        <a:cs typeface="+mn-cs"/>
+      </a:defRPr>
+    </a:lvl8pPr>
+    <a:lvl9pPr marL="3657600" algn="l" defTabSz="914400" rtl="0" eaLnBrk="1" latinLnBrk="0" hangingPunct="1">
+      <a:defRPr sz="1200" kern="1200">
+        <a:solidFill>
+          <a:schemeClr val="tx1"/>
+        </a:solidFill>
+        <a:latin typeface="+mn-lt"/>
+        <a:ea typeface="+mn-ea"/>
+        <a:cs typeface="+mn-cs"/>
+      </a:defRPr>
+    </a:lvl9pPr>
+  </p:notesStyle>
+</p:notesMaster>
+</file>
+
+<file path=ppt/notesSlides/notesSlide1.xml><?xml version="1.0" encoding="utf-8"?>
+<p:notes xmlns:a="http://schemas.openxmlformats.org/drawingml/2006/main" xmlns:r="http://schemas.openxmlformats.org/officeDocument/2006/relationships" xmlns:p="http://schemas.openxmlformats.org/presentationml/2006/main">
+  <p:cSld>
+    <p:spTree>
+      <p:nvGrpSpPr>
+        <p:cNvPr id="1" name=""/>
+        <p:cNvGrpSpPr/>
+        <p:nvPr/>
+      </p:nvGrpSpPr>
+      <p:grpSpPr>
+        <a:xfrm>
+          <a:off x="0" y="0"/>
+          <a:ext cx="0" cy="0"/>
+          <a:chOff x="0" y="0"/>
+          <a:chExt cx="0" cy="0"/>
+        </a:xfrm>
+      </p:grpSpPr>
+      <p:sp>
+        <p:nvSpPr>
+          <p:cNvPr id="2" name="Slide Image Placeholder 1"/>
+          <p:cNvSpPr>
+            <a:spLocks noGrp="1" noRot="1" noChangeAspect="1"/>
+          </p:cNvSpPr>
+          <p:nvPr>
+            <p:ph type="sldImg"/>
+          </p:nvPr>
+        </p:nvSpPr>
+        <p:spPr/>
+      </p:sp>
+      <p:sp>
+        <p:nvSpPr>
+          <p:cNvPr id="3" name="Notes Placeholder 2"/>
+          <p:cNvSpPr>
+            <a:spLocks noGrp="1"/>
+          </p:cNvSpPr>
+          <p:nvPr>
+            <p:ph type="body" idx="1"/>
+          </p:nvPr>
+        </p:nvSpPr>
+        <p:spPr/>
+        <p:txBody>
+          <a:bodyPr/>
+          <a:lstStyle/>
+          <a:p>
+            <a:pPr marL="171450" indent="-171450">
+              <a:buFontTx/>
+              <a:buChar char="-"/>
+            </a:pPr>
+            <a:r>
+              <a:rPr lang="nb-NO" noProof="0" dirty="0"/>
+              <a:t>Git kan virke litt skummelt fordi det forbindes med Linux og terminalvinduer, men det finnes mange gode klienter gjør git mindre skummelt</a:t>
+            </a:r>
+          </a:p>
+          <a:p>
+            <a:pPr marL="171450" indent="-171450">
+              <a:buFontTx/>
+              <a:buChar char="-"/>
+            </a:pPr>
+            <a:r>
+              <a:rPr lang="nb-NO" noProof="0" dirty="0"/>
+              <a:t>Fritt valg mellom kommandolinjeverktøy, GUI eller git-integrasjonen i ditt favoritt-IDE</a:t>
+            </a:r>
+          </a:p>
+          <a:p>
+            <a:pPr marL="171450" indent="-171450">
+              <a:buFontTx/>
+              <a:buChar char="-"/>
+            </a:pPr>
+            <a:r>
+              <a:rPr lang="nb-NO" noProof="0" dirty="0"/>
+              <a:t>Det er fullt mulig å bytte mellom git-klienter når som helst</a:t>
+            </a:r>
+          </a:p>
+        </p:txBody>
+      </p:sp>
+      <p:sp>
+        <p:nvSpPr>
+          <p:cNvPr id="4" name="Slide Number Placeholder 3"/>
+          <p:cNvSpPr>
+            <a:spLocks noGrp="1"/>
+          </p:cNvSpPr>
+          <p:nvPr>
+            <p:ph type="sldNum" sz="quarter" idx="5"/>
+          </p:nvPr>
+        </p:nvSpPr>
+        <p:spPr/>
+        <p:txBody>
+          <a:bodyPr/>
+          <a:lstStyle/>
+          <a:p>
+            <a:fld id="{0DB4DFF7-1581-4E3B-BF7C-6E7C7A791C1B}" type="slidenum">
+              <a:rPr lang="nb-NO" smtClean="0"/>
+              <a:t>3</a:t>
+            </a:fld>
+            <a:endParaRPr lang="nb-NO"/>
+          </a:p>
+        </p:txBody>
+      </p:sp>
+    </p:spTree>
+    <p:extLst>
+      <p:ext uri="{BB962C8B-B14F-4D97-AF65-F5344CB8AC3E}">
+        <p14:creationId xmlns:p14="http://schemas.microsoft.com/office/powerpoint/2010/main" val="40035375"/>
+      </p:ext>
+    </p:extLst>
+  </p:cSld>
+  <p:clrMapOvr>
+    <a:masterClrMapping/>
+  </p:clrMapOvr>
+</p:notes>
+</file>
+
+<file path=ppt/notesSlides/notesSlide2.xml><?xml version="1.0" encoding="utf-8"?>
+<p:notes xmlns:a="http://schemas.openxmlformats.org/drawingml/2006/main" xmlns:r="http://schemas.openxmlformats.org/officeDocument/2006/relationships" xmlns:p="http://schemas.openxmlformats.org/presentationml/2006/main">
+  <p:cSld>
+    <p:spTree>
+      <p:nvGrpSpPr>
+        <p:cNvPr id="1" name=""/>
+        <p:cNvGrpSpPr/>
+        <p:nvPr/>
+      </p:nvGrpSpPr>
+      <p:grpSpPr>
+        <a:xfrm>
+          <a:off x="0" y="0"/>
+          <a:ext cx="0" cy="0"/>
+          <a:chOff x="0" y="0"/>
+          <a:chExt cx="0" cy="0"/>
+        </a:xfrm>
+      </p:grpSpPr>
+      <p:sp>
+        <p:nvSpPr>
+          <p:cNvPr id="2" name="Slide Image Placeholder 1"/>
+          <p:cNvSpPr>
+            <a:spLocks noGrp="1" noRot="1" noChangeAspect="1"/>
+          </p:cNvSpPr>
+          <p:nvPr>
+            <p:ph type="sldImg"/>
+          </p:nvPr>
+        </p:nvSpPr>
+        <p:spPr/>
+      </p:sp>
+      <p:sp>
+        <p:nvSpPr>
+          <p:cNvPr id="3" name="Notes Placeholder 2"/>
+          <p:cNvSpPr>
+            <a:spLocks noGrp="1"/>
+          </p:cNvSpPr>
+          <p:nvPr>
+            <p:ph type="body" idx="1"/>
+          </p:nvPr>
+        </p:nvSpPr>
+        <p:spPr/>
+        <p:txBody>
+          <a:bodyPr/>
+          <a:lstStyle/>
+          <a:p>
+            <a:r>
+              <a:rPr lang="nb-NO" dirty="0"/>
+              <a:t>Mange setter likhetstegn mellom git og GitHub. Dette stemmer ikke. GitHub er en service som tilbyr hosting av git-</a:t>
+            </a:r>
+            <a:r>
+              <a:rPr lang="nb-NO" dirty="0" err="1"/>
+              <a:t>repoer</a:t>
+            </a:r>
+            <a:r>
+              <a:rPr lang="nb-NO" dirty="0"/>
+              <a:t>.</a:t>
+            </a:r>
+          </a:p>
+        </p:txBody>
+      </p:sp>
+      <p:sp>
+        <p:nvSpPr>
+          <p:cNvPr id="4" name="Slide Number Placeholder 3"/>
+          <p:cNvSpPr>
+            <a:spLocks noGrp="1"/>
+          </p:cNvSpPr>
+          <p:nvPr>
+            <p:ph type="sldNum" sz="quarter" idx="5"/>
+          </p:nvPr>
+        </p:nvSpPr>
+        <p:spPr/>
+        <p:txBody>
+          <a:bodyPr/>
+          <a:lstStyle/>
+          <a:p>
+            <a:fld id="{0DB4DFF7-1581-4E3B-BF7C-6E7C7A791C1B}" type="slidenum">
+              <a:rPr lang="nb-NO" smtClean="0"/>
+              <a:t>4</a:t>
+            </a:fld>
+            <a:endParaRPr lang="nb-NO"/>
+          </a:p>
+        </p:txBody>
+      </p:sp>
+    </p:spTree>
+    <p:extLst>
+      <p:ext uri="{BB962C8B-B14F-4D97-AF65-F5344CB8AC3E}">
+        <p14:creationId xmlns:p14="http://schemas.microsoft.com/office/powerpoint/2010/main" val="1677327366"/>
+      </p:ext>
+    </p:extLst>
+  </p:cSld>
+  <p:clrMapOvr>
+    <a:masterClrMapping/>
+  </p:clrMapOvr>
+</p:notes>
+</file>
+
+<file path=ppt/notesSlides/notesSlide3.xml><?xml version="1.0" encoding="utf-8"?>
+<p:notes xmlns:a="http://schemas.openxmlformats.org/drawingml/2006/main" xmlns:r="http://schemas.openxmlformats.org/officeDocument/2006/relationships" xmlns:p="http://schemas.openxmlformats.org/presentationml/2006/main">
+  <p:cSld>
+    <p:spTree>
+      <p:nvGrpSpPr>
+        <p:cNvPr id="1" name=""/>
+        <p:cNvGrpSpPr/>
+        <p:nvPr/>
+      </p:nvGrpSpPr>
+      <p:grpSpPr>
+        <a:xfrm>
+          <a:off x="0" y="0"/>
+          <a:ext cx="0" cy="0"/>
+          <a:chOff x="0" y="0"/>
+          <a:chExt cx="0" cy="0"/>
+        </a:xfrm>
+      </p:grpSpPr>
+      <p:sp>
+        <p:nvSpPr>
+          <p:cNvPr id="2" name="Slide Image Placeholder 1"/>
+          <p:cNvSpPr>
+            <a:spLocks noGrp="1" noRot="1" noChangeAspect="1"/>
+          </p:cNvSpPr>
+          <p:nvPr>
+            <p:ph type="sldImg"/>
+          </p:nvPr>
+        </p:nvSpPr>
+        <p:spPr/>
+      </p:sp>
+      <p:sp>
+        <p:nvSpPr>
+          <p:cNvPr id="3" name="Notes Placeholder 2"/>
+          <p:cNvSpPr>
+            <a:spLocks noGrp="1"/>
+          </p:cNvSpPr>
+          <p:nvPr>
+            <p:ph type="body" idx="1"/>
+          </p:nvPr>
+        </p:nvSpPr>
+        <p:spPr/>
+        <p:txBody>
+          <a:bodyPr/>
+          <a:lstStyle/>
+          <a:p>
+            <a:pPr marL="171450" indent="-171450">
+              <a:buFontTx/>
+              <a:buChar char="-"/>
+            </a:pPr>
+            <a:r>
+              <a:rPr lang="nb-NO" dirty="0"/>
+              <a:t>Git er et distribuert versjonskontrollsystem i motsetning til TFS som er et sentralisert versjonskontrollsystem.</a:t>
+            </a:r>
+          </a:p>
+          <a:p>
+            <a:endParaRPr lang="nb-NO" dirty="0"/>
+          </a:p>
+          <a:p>
+            <a:pPr marL="171450" indent="-171450">
+              <a:buFontTx/>
+              <a:buChar char="-"/>
+            </a:pPr>
+            <a:r>
+              <a:rPr lang="nb-NO" dirty="0"/>
+              <a:t>Git gjør det mye enklere å jobbe med brancher. Det er fort gjort å lage en egen branch for en ny feature det jobbes med, eller andre ting som f.eks. en oppdatering av et rammeverk eller Nuget-pakker. Når endringene i branchen er utført er det enkelt å merge inn denne branchen i master-branchen.  Branchene kan være bare lokale eller pushes til server. Brancher som er merget inn i master-branchen kan enten beholdes eller slettes om ønskelig.</a:t>
+            </a:r>
+          </a:p>
+          <a:p>
+            <a:pPr marL="0" indent="0">
+              <a:buFontTx/>
+              <a:buNone/>
+            </a:pPr>
+            <a:endParaRPr lang="nb-NO" dirty="0"/>
+          </a:p>
+          <a:p>
+            <a:pPr marL="171450" indent="-171450">
+              <a:buFontTx/>
+              <a:buChar char="-"/>
+            </a:pPr>
+            <a:r>
+              <a:rPr lang="nb-NO" dirty="0"/>
+              <a:t>Cherry </a:t>
+            </a:r>
+            <a:r>
+              <a:rPr lang="nb-NO" dirty="0" err="1"/>
+              <a:t>picking</a:t>
+            </a:r>
+            <a:endParaRPr lang="nb-NO" dirty="0"/>
+          </a:p>
+          <a:p>
+            <a:pPr marL="0" indent="0">
+              <a:buFontTx/>
+              <a:buNone/>
+            </a:pPr>
+            <a:endParaRPr lang="nb-NO" dirty="0"/>
+          </a:p>
+          <a:p>
+            <a:endParaRPr lang="nb-NO" dirty="0"/>
+          </a:p>
+        </p:txBody>
+      </p:sp>
+      <p:sp>
+        <p:nvSpPr>
+          <p:cNvPr id="4" name="Slide Number Placeholder 3"/>
+          <p:cNvSpPr>
+            <a:spLocks noGrp="1"/>
+          </p:cNvSpPr>
+          <p:nvPr>
+            <p:ph type="sldNum" sz="quarter" idx="5"/>
+          </p:nvPr>
+        </p:nvSpPr>
+        <p:spPr/>
+        <p:txBody>
+          <a:bodyPr/>
+          <a:lstStyle/>
+          <a:p>
+            <a:fld id="{0DB4DFF7-1581-4E3B-BF7C-6E7C7A791C1B}" type="slidenum">
+              <a:rPr lang="nb-NO" smtClean="0"/>
+              <a:t>6</a:t>
+            </a:fld>
+            <a:endParaRPr lang="nb-NO"/>
+          </a:p>
+        </p:txBody>
+      </p:sp>
+    </p:spTree>
+    <p:extLst>
+      <p:ext uri="{BB962C8B-B14F-4D97-AF65-F5344CB8AC3E}">
+        <p14:creationId xmlns:p14="http://schemas.microsoft.com/office/powerpoint/2010/main" val="43930762"/>
+      </p:ext>
+    </p:extLst>
+  </p:cSld>
+  <p:clrMapOvr>
+    <a:masterClrMapping/>
+  </p:clrMapOvr>
+</p:notes>
+</file>
+
+<file path=ppt/notesSlides/notesSlide4.xml><?xml version="1.0" encoding="utf-8"?>
+<p:notes xmlns:a="http://schemas.openxmlformats.org/drawingml/2006/main" xmlns:r="http://schemas.openxmlformats.org/officeDocument/2006/relationships" xmlns:p="http://schemas.openxmlformats.org/presentationml/2006/main">
+  <p:cSld>
+    <p:spTree>
+      <p:nvGrpSpPr>
+        <p:cNvPr id="1" name=""/>
+        <p:cNvGrpSpPr/>
+        <p:nvPr/>
+      </p:nvGrpSpPr>
+      <p:grpSpPr>
+        <a:xfrm>
+          <a:off x="0" y="0"/>
+          <a:ext cx="0" cy="0"/>
+          <a:chOff x="0" y="0"/>
+          <a:chExt cx="0" cy="0"/>
+        </a:xfrm>
+      </p:grpSpPr>
+      <p:sp>
+        <p:nvSpPr>
+          <p:cNvPr id="2" name="Slide Image Placeholder 1"/>
+          <p:cNvSpPr>
+            <a:spLocks noGrp="1" noRot="1" noChangeAspect="1"/>
+          </p:cNvSpPr>
+          <p:nvPr>
+            <p:ph type="sldImg"/>
+          </p:nvPr>
+        </p:nvSpPr>
+        <p:spPr/>
+      </p:sp>
+      <p:sp>
+        <p:nvSpPr>
+          <p:cNvPr id="3" name="Notes Placeholder 2"/>
+          <p:cNvSpPr>
+            <a:spLocks noGrp="1"/>
+          </p:cNvSpPr>
+          <p:nvPr>
+            <p:ph type="body" idx="1"/>
+          </p:nvPr>
+        </p:nvSpPr>
+        <p:spPr/>
+        <p:txBody>
+          <a:bodyPr/>
+          <a:lstStyle/>
+          <a:p>
+            <a:pPr marL="171450" indent="-171450">
+              <a:buFontTx/>
+              <a:buChar char="-"/>
+            </a:pPr>
+            <a:r>
+              <a:rPr lang="nb-NO" dirty="0"/>
+              <a:t>Microsoft har støttet git i Visual Studio helt siden VS2013.</a:t>
+            </a:r>
+          </a:p>
+          <a:p>
+            <a:pPr marL="171450" indent="-171450">
+              <a:buFontTx/>
+              <a:buChar char="-"/>
+            </a:pPr>
+            <a:r>
+              <a:rPr lang="nb-NO" dirty="0"/>
+              <a:t>Det er fullt mulig å bruke git som versjonskontroll ved å kun bruke Visual Studio som git-klient.</a:t>
+            </a:r>
+          </a:p>
+          <a:p>
+            <a:pPr marL="171450" indent="-171450">
+              <a:buFontTx/>
+              <a:buChar char="-"/>
+            </a:pPr>
+            <a:r>
+              <a:rPr lang="nb-NO" dirty="0"/>
+              <a:t>Alle de vesentlige git-funksjonene er integrert i Team Explorer-vinduet og  oppfører seg veldig likt som å arbeide mot TFS.</a:t>
+            </a:r>
+          </a:p>
+          <a:p>
+            <a:pPr marL="171450" indent="-171450">
+              <a:buFontTx/>
+              <a:buChar char="-"/>
+            </a:pPr>
+            <a:r>
+              <a:rPr lang="nb-NO" dirty="0"/>
+              <a:t>Visual Studio bruker git som standard versjonskontroll ved opprettelse av nye prosjekter.</a:t>
+            </a:r>
+          </a:p>
+        </p:txBody>
+      </p:sp>
+      <p:sp>
+        <p:nvSpPr>
+          <p:cNvPr id="4" name="Slide Number Placeholder 3"/>
+          <p:cNvSpPr>
+            <a:spLocks noGrp="1"/>
+          </p:cNvSpPr>
+          <p:nvPr>
+            <p:ph type="sldNum" sz="quarter" idx="5"/>
+          </p:nvPr>
+        </p:nvSpPr>
+        <p:spPr/>
+        <p:txBody>
+          <a:bodyPr/>
+          <a:lstStyle/>
+          <a:p>
+            <a:fld id="{0DB4DFF7-1581-4E3B-BF7C-6E7C7A791C1B}" type="slidenum">
+              <a:rPr lang="nb-NO" smtClean="0"/>
+              <a:t>7</a:t>
+            </a:fld>
+            <a:endParaRPr lang="nb-NO"/>
+          </a:p>
+        </p:txBody>
+      </p:sp>
+    </p:spTree>
+    <p:extLst>
+      <p:ext uri="{BB962C8B-B14F-4D97-AF65-F5344CB8AC3E}">
+        <p14:creationId xmlns:p14="http://schemas.microsoft.com/office/powerpoint/2010/main" val="141360281"/>
+      </p:ext>
+    </p:extLst>
+  </p:cSld>
+  <p:clrMapOvr>
+    <a:masterClrMapping/>
+  </p:clrMapOvr>
+</p:notes>
+</file>
+
+<file path=ppt/notesSlides/notesSlide5.xml><?xml version="1.0" encoding="utf-8"?>
+<p:notes xmlns:a="http://schemas.openxmlformats.org/drawingml/2006/main" xmlns:r="http://schemas.openxmlformats.org/officeDocument/2006/relationships" xmlns:p="http://schemas.openxmlformats.org/presentationml/2006/main">
+  <p:cSld>
+    <p:spTree>
+      <p:nvGrpSpPr>
+        <p:cNvPr id="1" name=""/>
+        <p:cNvGrpSpPr/>
+        <p:nvPr/>
+      </p:nvGrpSpPr>
+      <p:grpSpPr>
+        <a:xfrm>
+          <a:off x="0" y="0"/>
+          <a:ext cx="0" cy="0"/>
+          <a:chOff x="0" y="0"/>
+          <a:chExt cx="0" cy="0"/>
+        </a:xfrm>
+      </p:grpSpPr>
+      <p:sp>
+        <p:nvSpPr>
+          <p:cNvPr id="2" name="Slide Image Placeholder 1"/>
+          <p:cNvSpPr>
+            <a:spLocks noGrp="1" noRot="1" noChangeAspect="1"/>
+          </p:cNvSpPr>
+          <p:nvPr>
+            <p:ph type="sldImg"/>
+          </p:nvPr>
+        </p:nvSpPr>
+        <p:spPr/>
+      </p:sp>
+      <p:sp>
+        <p:nvSpPr>
+          <p:cNvPr id="3" name="Notes Placeholder 2"/>
+          <p:cNvSpPr>
+            <a:spLocks noGrp="1"/>
+          </p:cNvSpPr>
+          <p:nvPr>
+            <p:ph type="body" idx="1"/>
+          </p:nvPr>
+        </p:nvSpPr>
+        <p:spPr/>
+        <p:txBody>
+          <a:bodyPr/>
+          <a:lstStyle/>
+          <a:p>
+            <a:pPr marL="171450" indent="-171450">
+              <a:buFontTx/>
+              <a:buChar char="-"/>
+            </a:pPr>
+            <a:r>
+              <a:rPr lang="nb-NO" dirty="0"/>
+              <a:t>Styrken til git er at det er integrert i så å si alle </a:t>
+            </a:r>
+            <a:r>
+              <a:rPr lang="nb-NO" dirty="0" err="1"/>
+              <a:t>IDE’er</a:t>
+            </a:r>
+            <a:r>
+              <a:rPr lang="nb-NO" dirty="0"/>
+              <a:t> på tvers av alle plattformer.</a:t>
+            </a:r>
+          </a:p>
+          <a:p>
+            <a:pPr marL="171450" indent="-171450">
+              <a:buFontTx/>
+              <a:buChar char="-"/>
+            </a:pPr>
+            <a:r>
+              <a:rPr lang="nb-NO" dirty="0"/>
+              <a:t>Dette gjelder også den offisielle kommandolinjeklienten og GUI-klienten.</a:t>
+            </a:r>
+          </a:p>
+          <a:p>
+            <a:pPr marL="171450" indent="-171450">
+              <a:buFontTx/>
+              <a:buChar char="-"/>
+            </a:pPr>
+            <a:r>
+              <a:rPr lang="nb-NO" dirty="0"/>
+              <a:t>I tillegg finnes det veldig mange tredjepartsprogrammer for å jobbe med git.</a:t>
+            </a:r>
+          </a:p>
+          <a:p>
+            <a:pPr marL="171450" indent="-171450">
+              <a:buFontTx/>
+              <a:buChar char="-"/>
+            </a:pPr>
+            <a:r>
+              <a:rPr lang="nb-NO" dirty="0"/>
+              <a:t>Git kan brukes overalt</a:t>
+            </a:r>
+          </a:p>
+        </p:txBody>
+      </p:sp>
+      <p:sp>
+        <p:nvSpPr>
+          <p:cNvPr id="4" name="Slide Number Placeholder 3"/>
+          <p:cNvSpPr>
+            <a:spLocks noGrp="1"/>
+          </p:cNvSpPr>
+          <p:nvPr>
+            <p:ph type="sldNum" sz="quarter" idx="5"/>
+          </p:nvPr>
+        </p:nvSpPr>
+        <p:spPr/>
+        <p:txBody>
+          <a:bodyPr/>
+          <a:lstStyle/>
+          <a:p>
+            <a:fld id="{0DB4DFF7-1581-4E3B-BF7C-6E7C7A791C1B}" type="slidenum">
+              <a:rPr lang="nb-NO" smtClean="0"/>
+              <a:t>8</a:t>
+            </a:fld>
+            <a:endParaRPr lang="nb-NO"/>
+          </a:p>
+        </p:txBody>
+      </p:sp>
+    </p:spTree>
+    <p:extLst>
+      <p:ext uri="{BB962C8B-B14F-4D97-AF65-F5344CB8AC3E}">
+        <p14:creationId xmlns:p14="http://schemas.microsoft.com/office/powerpoint/2010/main" val="2791028589"/>
+      </p:ext>
+    </p:extLst>
+  </p:cSld>
+  <p:clrMapOvr>
+    <a:masterClrMapping/>
+  </p:clrMapOvr>
+</p:notes>
+</file>
+
+<file path=ppt/notesSlides/notesSlide6.xml><?xml version="1.0" encoding="utf-8"?>
+<p:notes xmlns:a="http://schemas.openxmlformats.org/drawingml/2006/main" xmlns:r="http://schemas.openxmlformats.org/officeDocument/2006/relationships" xmlns:p="http://schemas.openxmlformats.org/presentationml/2006/main">
+  <p:cSld>
+    <p:spTree>
+      <p:nvGrpSpPr>
+        <p:cNvPr id="1" name=""/>
+        <p:cNvGrpSpPr/>
+        <p:nvPr/>
+      </p:nvGrpSpPr>
+      <p:grpSpPr>
+        <a:xfrm>
+          <a:off x="0" y="0"/>
+          <a:ext cx="0" cy="0"/>
+          <a:chOff x="0" y="0"/>
+          <a:chExt cx="0" cy="0"/>
+        </a:xfrm>
+      </p:grpSpPr>
+      <p:sp>
+        <p:nvSpPr>
+          <p:cNvPr id="2" name="Slide Image Placeholder 1"/>
+          <p:cNvSpPr>
+            <a:spLocks noGrp="1" noRot="1" noChangeAspect="1"/>
+          </p:cNvSpPr>
+          <p:nvPr>
+            <p:ph type="sldImg"/>
+          </p:nvPr>
+        </p:nvSpPr>
+        <p:spPr/>
+      </p:sp>
+      <p:sp>
+        <p:nvSpPr>
+          <p:cNvPr id="3" name="Notes Placeholder 2"/>
+          <p:cNvSpPr>
+            <a:spLocks noGrp="1"/>
+          </p:cNvSpPr>
+          <p:nvPr>
+            <p:ph type="body" idx="1"/>
+          </p:nvPr>
+        </p:nvSpPr>
+        <p:spPr/>
+        <p:txBody>
+          <a:bodyPr/>
+          <a:lstStyle/>
+          <a:p>
+            <a:pPr marL="171450" indent="-171450">
+              <a:buFontTx/>
+              <a:buChar char="-"/>
+            </a:pPr>
+            <a:r>
+              <a:rPr lang="nb-NO" dirty="0"/>
+              <a:t>Et git-</a:t>
+            </a:r>
+            <a:r>
+              <a:rPr lang="nb-NO" dirty="0" err="1"/>
+              <a:t>repo</a:t>
+            </a:r>
+            <a:r>
+              <a:rPr lang="nb-NO" dirty="0"/>
+              <a:t> kan enkelt settes opp og brukes på én enkelt maskin av én utvikler.</a:t>
+            </a:r>
+          </a:p>
+          <a:p>
+            <a:pPr marL="171450" indent="-171450">
+              <a:buFontTx/>
+              <a:buChar char="-"/>
+            </a:pPr>
+            <a:r>
+              <a:rPr lang="nb-NO" dirty="0"/>
+              <a:t>For å gjøre det enklere å samarbeide på et prosjekt må git-</a:t>
+            </a:r>
+            <a:r>
+              <a:rPr lang="nb-NO" dirty="0" err="1"/>
+              <a:t>repoet</a:t>
+            </a:r>
+            <a:r>
+              <a:rPr lang="nb-NO" dirty="0"/>
+              <a:t> hostes på en server som utviklerne kan pushe og </a:t>
+            </a:r>
+            <a:r>
+              <a:rPr lang="nb-NO" dirty="0" err="1"/>
+              <a:t>pulle</a:t>
+            </a:r>
+            <a:r>
+              <a:rPr lang="nb-NO" dirty="0"/>
+              <a:t> kode fra.</a:t>
+            </a:r>
+          </a:p>
+          <a:p>
+            <a:pPr marL="171450" indent="-171450">
+              <a:buFontTx/>
+              <a:buChar char="-"/>
+            </a:pPr>
+            <a:r>
+              <a:rPr lang="nb-NO" dirty="0"/>
+              <a:t>Det finnes mange slike tjenester som tilbyr både åpne og private </a:t>
+            </a:r>
+            <a:r>
+              <a:rPr lang="nb-NO" dirty="0" err="1"/>
+              <a:t>repoer</a:t>
+            </a:r>
+            <a:r>
+              <a:rPr lang="nb-NO" dirty="0"/>
+              <a:t>. I tillegg har de største mulighet for å installere en </a:t>
+            </a:r>
+            <a:r>
+              <a:rPr lang="nb-NO" dirty="0" err="1"/>
+              <a:t>enterprise</a:t>
+            </a:r>
+            <a:r>
+              <a:rPr lang="nb-NO" dirty="0"/>
+              <a:t>-versjon på våre egne servere.</a:t>
+            </a:r>
+          </a:p>
+          <a:p>
+            <a:pPr marL="171450" indent="-171450">
+              <a:buFontTx/>
+              <a:buChar char="-"/>
+            </a:pPr>
+            <a:r>
+              <a:rPr lang="nb-NO" dirty="0"/>
+              <a:t>Disse tjenestene hoster hele git-</a:t>
+            </a:r>
+            <a:r>
+              <a:rPr lang="nb-NO" dirty="0" err="1"/>
+              <a:t>repoet</a:t>
+            </a:r>
+            <a:r>
+              <a:rPr lang="nb-NO" dirty="0"/>
+              <a:t> og har i tillegg funksjoner som </a:t>
+            </a:r>
+            <a:r>
+              <a:rPr lang="nb-NO" dirty="0" err="1"/>
+              <a:t>issue</a:t>
+            </a:r>
+            <a:r>
+              <a:rPr lang="nb-NO" dirty="0"/>
+              <a:t>-håndtering, wiki for dokumentasjon og pull </a:t>
+            </a:r>
+            <a:r>
+              <a:rPr lang="nb-NO" dirty="0" err="1"/>
+              <a:t>requests</a:t>
+            </a:r>
+            <a:r>
+              <a:rPr lang="nb-NO" dirty="0"/>
+              <a:t> for </a:t>
+            </a:r>
+            <a:r>
+              <a:rPr lang="nb-NO" dirty="0" err="1"/>
+              <a:t>code</a:t>
+            </a:r>
+            <a:r>
+              <a:rPr lang="nb-NO" dirty="0"/>
+              <a:t> </a:t>
+            </a:r>
+            <a:r>
+              <a:rPr lang="nb-NO" dirty="0" err="1"/>
+              <a:t>review</a:t>
+            </a:r>
+            <a:r>
+              <a:rPr lang="nb-NO" dirty="0"/>
+              <a:t>.</a:t>
+            </a:r>
+          </a:p>
+          <a:p>
+            <a:pPr marL="171450" indent="-171450">
+              <a:buFontTx/>
+              <a:buChar char="-"/>
+            </a:pPr>
+            <a:r>
+              <a:rPr lang="nb-NO" dirty="0"/>
+              <a:t>All git-historikken kan blas gjennom og det er veldig enkelt å sammenligne to versjoner av en fil eller å hente frem en gammel versjon osv.</a:t>
+            </a:r>
+          </a:p>
+          <a:p>
+            <a:pPr marL="171450" indent="-171450">
+              <a:buFontTx/>
+              <a:buChar char="-"/>
+            </a:pPr>
+            <a:r>
+              <a:rPr lang="nb-NO" dirty="0"/>
+              <a:t>De fleste tjenestene har også støtte for </a:t>
+            </a:r>
+            <a:r>
+              <a:rPr lang="nb-NO" dirty="0" err="1"/>
+              <a:t>continuous</a:t>
+            </a:r>
+            <a:r>
+              <a:rPr lang="nb-NO" dirty="0"/>
+              <a:t> </a:t>
+            </a:r>
+            <a:r>
+              <a:rPr lang="nb-NO" dirty="0" err="1"/>
+              <a:t>integration</a:t>
+            </a:r>
+            <a:r>
+              <a:rPr lang="nb-NO" dirty="0"/>
+              <a:t>, dvs. automatisk bygging og testing av prosjektet ved hver oppdatering av master-branchen f.eks. Det er også mulig å sette opp automatisk publisering til staging- og produksjonsmiljøer.</a:t>
+            </a:r>
+          </a:p>
+        </p:txBody>
+      </p:sp>
+      <p:sp>
+        <p:nvSpPr>
+          <p:cNvPr id="4" name="Slide Number Placeholder 3"/>
+          <p:cNvSpPr>
+            <a:spLocks noGrp="1"/>
+          </p:cNvSpPr>
+          <p:nvPr>
+            <p:ph type="sldNum" sz="quarter" idx="5"/>
+          </p:nvPr>
+        </p:nvSpPr>
+        <p:spPr/>
+        <p:txBody>
+          <a:bodyPr/>
+          <a:lstStyle/>
+          <a:p>
+            <a:fld id="{0DB4DFF7-1581-4E3B-BF7C-6E7C7A791C1B}" type="slidenum">
+              <a:rPr lang="nb-NO" smtClean="0"/>
+              <a:t>9</a:t>
+            </a:fld>
+            <a:endParaRPr lang="nb-NO"/>
+          </a:p>
+        </p:txBody>
+      </p:sp>
+    </p:spTree>
+    <p:extLst>
+      <p:ext uri="{BB962C8B-B14F-4D97-AF65-F5344CB8AC3E}">
+        <p14:creationId xmlns:p14="http://schemas.microsoft.com/office/powerpoint/2010/main" val="4228632627"/>
+      </p:ext>
+    </p:extLst>
+  </p:cSld>
+  <p:clrMapOvr>
+    <a:masterClrMapping/>
+  </p:clrMapOvr>
+</p:notes>
+</file>
+
+<file path=ppt/notesSlides/notesSlide7.xml><?xml version="1.0" encoding="utf-8"?>
+<p:notes xmlns:a="http://schemas.openxmlformats.org/drawingml/2006/main" xmlns:r="http://schemas.openxmlformats.org/officeDocument/2006/relationships" xmlns:p="http://schemas.openxmlformats.org/presentationml/2006/main">
+  <p:cSld>
+    <p:spTree>
+      <p:nvGrpSpPr>
+        <p:cNvPr id="1" name=""/>
+        <p:cNvGrpSpPr/>
+        <p:nvPr/>
+      </p:nvGrpSpPr>
+      <p:grpSpPr>
+        <a:xfrm>
+          <a:off x="0" y="0"/>
+          <a:ext cx="0" cy="0"/>
+          <a:chOff x="0" y="0"/>
+          <a:chExt cx="0" cy="0"/>
+        </a:xfrm>
+      </p:grpSpPr>
+      <p:sp>
+        <p:nvSpPr>
+          <p:cNvPr id="2" name="Slide Image Placeholder 1"/>
+          <p:cNvSpPr>
+            <a:spLocks noGrp="1" noRot="1" noChangeAspect="1"/>
+          </p:cNvSpPr>
+          <p:nvPr>
+            <p:ph type="sldImg"/>
+          </p:nvPr>
+        </p:nvSpPr>
+        <p:spPr/>
+      </p:sp>
+      <p:sp>
+        <p:nvSpPr>
+          <p:cNvPr id="3" name="Notes Placeholder 2"/>
+          <p:cNvSpPr>
+            <a:spLocks noGrp="1"/>
+          </p:cNvSpPr>
+          <p:nvPr>
+            <p:ph type="body" idx="1"/>
+          </p:nvPr>
+        </p:nvSpPr>
+        <p:spPr/>
+        <p:txBody>
+          <a:bodyPr/>
+          <a:lstStyle/>
+          <a:p>
+            <a:pPr marL="171450" indent="-171450">
+              <a:buFontTx/>
+              <a:buChar char="-"/>
+            </a:pPr>
+            <a:r>
+              <a:rPr lang="en-US" dirty="0" err="1"/>
+              <a:t>Skjermbilder</a:t>
+            </a:r>
+            <a:r>
+              <a:rPr lang="en-US" dirty="0"/>
+              <a:t> </a:t>
+            </a:r>
+            <a:r>
+              <a:rPr lang="en-US" dirty="0" err="1"/>
+              <a:t>fra</a:t>
+            </a:r>
+            <a:r>
+              <a:rPr lang="en-US" dirty="0"/>
+              <a:t> GitHub</a:t>
+            </a:r>
+          </a:p>
+          <a:p>
+            <a:pPr marL="171450" indent="-171450">
+              <a:buFontTx/>
+              <a:buChar char="-"/>
+            </a:pPr>
+            <a:r>
+              <a:rPr lang="en-US" dirty="0" err="1"/>
+              <a:t>Hovedsiden</a:t>
+            </a:r>
+            <a:r>
+              <a:rPr lang="en-US" dirty="0"/>
+              <a:t> </a:t>
+            </a:r>
+            <a:r>
+              <a:rPr lang="en-US" dirty="0" err="1"/>
+              <a:t>til</a:t>
+            </a:r>
+            <a:r>
+              <a:rPr lang="en-US" dirty="0"/>
+              <a:t> </a:t>
+            </a:r>
+            <a:r>
+              <a:rPr lang="en-US" dirty="0" err="1"/>
+              <a:t>repoet</a:t>
+            </a:r>
+            <a:r>
+              <a:rPr lang="en-US" dirty="0"/>
+              <a:t> </a:t>
+            </a:r>
+            <a:r>
+              <a:rPr lang="en-US" dirty="0" err="1"/>
+              <a:t>viser</a:t>
+            </a:r>
+            <a:r>
+              <a:rPr lang="en-US" dirty="0"/>
+              <a:t> </a:t>
+            </a:r>
+            <a:r>
+              <a:rPr lang="en-US" dirty="0" err="1"/>
+              <a:t>fillisten</a:t>
+            </a:r>
+            <a:r>
+              <a:rPr lang="en-US" dirty="0"/>
+              <a:t> </a:t>
+            </a:r>
+            <a:r>
+              <a:rPr lang="en-US" dirty="0" err="1"/>
+              <a:t>og</a:t>
+            </a:r>
+            <a:r>
+              <a:rPr lang="en-US" dirty="0"/>
+              <a:t> README </a:t>
+            </a:r>
+            <a:r>
+              <a:rPr lang="en-US" dirty="0" err="1"/>
+              <a:t>filen</a:t>
+            </a:r>
+            <a:endParaRPr lang="nb-NO" dirty="0"/>
+          </a:p>
+          <a:p>
+            <a:pPr marL="171450" indent="-171450">
+              <a:buFontTx/>
+              <a:buChar char="-"/>
+            </a:pPr>
+            <a:r>
+              <a:rPr lang="en-US" dirty="0"/>
+              <a:t>D</a:t>
+            </a:r>
+            <a:r>
+              <a:rPr lang="nb-NO" dirty="0" err="1"/>
+              <a:t>iff</a:t>
+            </a:r>
+            <a:r>
+              <a:rPr lang="nb-NO" dirty="0"/>
+              <a:t> for en commit som viser hvilke filer og hvilket innhold som har blitt endret</a:t>
+            </a:r>
+            <a:endParaRPr lang="en-US" dirty="0"/>
+          </a:p>
+        </p:txBody>
+      </p:sp>
+      <p:sp>
+        <p:nvSpPr>
+          <p:cNvPr id="4" name="Slide Number Placeholder 3"/>
+          <p:cNvSpPr>
+            <a:spLocks noGrp="1"/>
+          </p:cNvSpPr>
+          <p:nvPr>
+            <p:ph type="sldNum" sz="quarter" idx="5"/>
+          </p:nvPr>
+        </p:nvSpPr>
+        <p:spPr/>
+        <p:txBody>
+          <a:bodyPr/>
+          <a:lstStyle/>
+          <a:p>
+            <a:fld id="{0DB4DFF7-1581-4E3B-BF7C-6E7C7A791C1B}" type="slidenum">
+              <a:rPr lang="nb-NO" smtClean="0"/>
+              <a:t>10</a:t>
+            </a:fld>
+            <a:endParaRPr lang="nb-NO"/>
+          </a:p>
+        </p:txBody>
+      </p:sp>
+    </p:spTree>
+    <p:extLst>
+      <p:ext uri="{BB962C8B-B14F-4D97-AF65-F5344CB8AC3E}">
+        <p14:creationId xmlns:p14="http://schemas.microsoft.com/office/powerpoint/2010/main" val="2877476484"/>
+      </p:ext>
+    </p:extLst>
+  </p:cSld>
+  <p:clrMapOvr>
+    <a:masterClrMapping/>
+  </p:clrMapOvr>
+</p:notes>
+</file>
+
+<file path=ppt/notesSlides/notesSlide8.xml><?xml version="1.0" encoding="utf-8"?>
+<p:notes xmlns:a="http://schemas.openxmlformats.org/drawingml/2006/main" xmlns:r="http://schemas.openxmlformats.org/officeDocument/2006/relationships" xmlns:p="http://schemas.openxmlformats.org/presentationml/2006/main">
+  <p:cSld>
+    <p:spTree>
+      <p:nvGrpSpPr>
+        <p:cNvPr id="1" name=""/>
+        <p:cNvGrpSpPr/>
+        <p:nvPr/>
+      </p:nvGrpSpPr>
+      <p:grpSpPr>
+        <a:xfrm>
+          <a:off x="0" y="0"/>
+          <a:ext cx="0" cy="0"/>
+          <a:chOff x="0" y="0"/>
+          <a:chExt cx="0" cy="0"/>
+        </a:xfrm>
+      </p:grpSpPr>
+      <p:sp>
+        <p:nvSpPr>
+          <p:cNvPr id="2" name="Slide Image Placeholder 1"/>
+          <p:cNvSpPr>
+            <a:spLocks noGrp="1" noRot="1" noChangeAspect="1"/>
+          </p:cNvSpPr>
+          <p:nvPr>
+            <p:ph type="sldImg"/>
+          </p:nvPr>
+        </p:nvSpPr>
+        <p:spPr/>
+      </p:sp>
+      <p:sp>
+        <p:nvSpPr>
+          <p:cNvPr id="3" name="Notes Placeholder 2"/>
+          <p:cNvSpPr>
+            <a:spLocks noGrp="1"/>
+          </p:cNvSpPr>
+          <p:nvPr>
+            <p:ph type="body" idx="1"/>
+          </p:nvPr>
+        </p:nvSpPr>
+        <p:spPr/>
+        <p:txBody>
+          <a:bodyPr/>
+          <a:lstStyle/>
+          <a:p>
+            <a:pPr marL="171450" indent="-171450">
+              <a:buFontTx/>
+              <a:buChar char="-"/>
+            </a:pPr>
+            <a:r>
+              <a:rPr lang="nb-NO" noProof="0" dirty="0"/>
+              <a:t>Git kan brukes for alle typer filer, ikke bare kode</a:t>
+            </a:r>
+          </a:p>
+          <a:p>
+            <a:pPr marL="628650" lvl="1" indent="-171450">
+              <a:buFontTx/>
+              <a:buChar char="-"/>
+            </a:pPr>
+            <a:r>
+              <a:rPr lang="nb-NO" noProof="0" dirty="0"/>
+              <a:t>Dokumenter</a:t>
+            </a:r>
+          </a:p>
+          <a:p>
+            <a:pPr marL="628650" lvl="1" indent="-171450">
+              <a:buFontTx/>
+              <a:buChar char="-"/>
+            </a:pPr>
+            <a:r>
+              <a:rPr lang="nb-NO" noProof="0" dirty="0"/>
+              <a:t>Bilder</a:t>
+            </a:r>
+          </a:p>
+          <a:p>
+            <a:pPr marL="628650" lvl="1" indent="-171450">
+              <a:buFontTx/>
+              <a:buChar char="-"/>
+            </a:pPr>
+            <a:r>
+              <a:rPr lang="nb-NO" noProof="0" dirty="0"/>
+              <a:t>Binærfiler</a:t>
+            </a:r>
+          </a:p>
+          <a:p>
+            <a:pPr marL="628650" lvl="1" indent="-171450">
+              <a:buFontTx/>
+              <a:buChar char="-"/>
+            </a:pPr>
+            <a:r>
+              <a:rPr lang="nb-NO" noProof="0" dirty="0"/>
+              <a:t>Git LFS for veldig store filer som f.eks. Video</a:t>
+            </a:r>
+          </a:p>
+          <a:p>
+            <a:pPr marL="628650" lvl="1" indent="-171450">
+              <a:buFontTx/>
+              <a:buChar char="-"/>
+            </a:pPr>
+            <a:endParaRPr lang="nb-NO" noProof="0" dirty="0"/>
+          </a:p>
+          <a:p>
+            <a:pPr marL="171450" lvl="0" indent="-171450">
+              <a:buFontTx/>
+              <a:buChar char="-"/>
+            </a:pPr>
+            <a:r>
+              <a:rPr lang="nb-NO" noProof="0" dirty="0"/>
+              <a:t>Fritt valg av git-klient, må ikke jobbe i et IDE for å bruke git</a:t>
+            </a:r>
+          </a:p>
+        </p:txBody>
+      </p:sp>
+      <p:sp>
+        <p:nvSpPr>
+          <p:cNvPr id="4" name="Slide Number Placeholder 3"/>
+          <p:cNvSpPr>
+            <a:spLocks noGrp="1"/>
+          </p:cNvSpPr>
+          <p:nvPr>
+            <p:ph type="sldNum" sz="quarter" idx="5"/>
+          </p:nvPr>
+        </p:nvSpPr>
+        <p:spPr/>
+        <p:txBody>
+          <a:bodyPr/>
+          <a:lstStyle/>
+          <a:p>
+            <a:fld id="{0DB4DFF7-1581-4E3B-BF7C-6E7C7A791C1B}" type="slidenum">
+              <a:rPr lang="nb-NO" smtClean="0"/>
+              <a:t>11</a:t>
+            </a:fld>
+            <a:endParaRPr lang="nb-NO"/>
+          </a:p>
+        </p:txBody>
+      </p:sp>
+    </p:spTree>
+    <p:extLst>
+      <p:ext uri="{BB962C8B-B14F-4D97-AF65-F5344CB8AC3E}">
+        <p14:creationId xmlns:p14="http://schemas.microsoft.com/office/powerpoint/2010/main" val="2555288000"/>
+      </p:ext>
+    </p:extLst>
+  </p:cSld>
+  <p:clrMapOvr>
+    <a:masterClrMapping/>
+  </p:clrMapOvr>
+</p:notes>
+</file>
+
+<file path=ppt/notesSlides/notesSlide9.xml><?xml version="1.0" encoding="utf-8"?>
+<p:notes xmlns:a="http://schemas.openxmlformats.org/drawingml/2006/main" xmlns:r="http://schemas.openxmlformats.org/officeDocument/2006/relationships" xmlns:p="http://schemas.openxmlformats.org/presentationml/2006/main">
+  <p:cSld>
+    <p:spTree>
+      <p:nvGrpSpPr>
+        <p:cNvPr id="1" name=""/>
+        <p:cNvGrpSpPr/>
+        <p:nvPr/>
+      </p:nvGrpSpPr>
+      <p:grpSpPr>
+        <a:xfrm>
+          <a:off x="0" y="0"/>
+          <a:ext cx="0" cy="0"/>
+          <a:chOff x="0" y="0"/>
+          <a:chExt cx="0" cy="0"/>
+        </a:xfrm>
+      </p:grpSpPr>
+      <p:sp>
+        <p:nvSpPr>
+          <p:cNvPr id="2" name="Slide Image Placeholder 1"/>
+          <p:cNvSpPr>
+            <a:spLocks noGrp="1" noRot="1" noChangeAspect="1"/>
+          </p:cNvSpPr>
+          <p:nvPr>
+            <p:ph type="sldImg"/>
+          </p:nvPr>
+        </p:nvSpPr>
+        <p:spPr/>
+      </p:sp>
+      <p:sp>
+        <p:nvSpPr>
+          <p:cNvPr id="3" name="Notes Placeholder 2"/>
+          <p:cNvSpPr>
+            <a:spLocks noGrp="1"/>
+          </p:cNvSpPr>
+          <p:nvPr>
+            <p:ph type="body" idx="1"/>
+          </p:nvPr>
+        </p:nvSpPr>
+        <p:spPr/>
+        <p:txBody>
+          <a:bodyPr/>
+          <a:lstStyle/>
+          <a:p>
+            <a:pPr marL="171450" indent="-171450">
+              <a:buFontTx/>
+              <a:buChar char="-"/>
+            </a:pPr>
+            <a:r>
+              <a:rPr lang="nb-NO" noProof="0" dirty="0"/>
+              <a:t>Det første bildet viser en typisk måte å lagre flere versjoner av et dokument på</a:t>
+            </a:r>
+          </a:p>
+          <a:p>
+            <a:pPr marL="171450" indent="-171450">
+              <a:buFontTx/>
+              <a:buChar char="-"/>
+            </a:pPr>
+            <a:r>
+              <a:rPr lang="nb-NO" noProof="0" dirty="0"/>
+              <a:t>Dette blir fort rotete og krever i minste fall en definert mal for filnavn om det skal være i nærheten av oversiktlig</a:t>
+            </a:r>
+          </a:p>
+          <a:p>
+            <a:pPr marL="171450" indent="-171450">
+              <a:buFontTx/>
+              <a:buChar char="-"/>
+            </a:pPr>
+            <a:endParaRPr lang="nb-NO" noProof="0" dirty="0"/>
+          </a:p>
+          <a:p>
+            <a:pPr marL="171450" indent="-171450">
+              <a:buFontTx/>
+              <a:buChar char="-"/>
+            </a:pPr>
+            <a:r>
+              <a:rPr lang="nb-NO" noProof="0" dirty="0"/>
+              <a:t>Ved å bruke git trenger vi bare én fil; “avtale.docx”</a:t>
+            </a:r>
+          </a:p>
+          <a:p>
+            <a:pPr marL="171450" indent="-171450">
+              <a:buFontTx/>
+              <a:buChar char="-"/>
+            </a:pPr>
+            <a:r>
+              <a:rPr lang="nb-NO" noProof="0" dirty="0"/>
+              <a:t>Hver endring blir til en commit I git-historikken</a:t>
+            </a:r>
+          </a:p>
+          <a:p>
+            <a:pPr marL="171450" indent="-171450">
+              <a:buFontTx/>
+              <a:buChar char="-"/>
+            </a:pPr>
+            <a:r>
+              <a:rPr lang="nb-NO" noProof="0" dirty="0"/>
+              <a:t>Man kan når som helst gå tilbake å se på endringene eller gjenopprette en tidligere versjon av filen</a:t>
+            </a:r>
+          </a:p>
+          <a:p>
+            <a:pPr marL="171450" indent="-171450">
+              <a:buFontTx/>
+              <a:buChar char="-"/>
+            </a:pPr>
+            <a:r>
+              <a:rPr lang="en-US" noProof="0" dirty="0"/>
+              <a:t>Det </a:t>
+            </a:r>
+            <a:r>
+              <a:rPr lang="en-US" noProof="0" dirty="0" err="1"/>
+              <a:t>er</a:t>
+            </a:r>
+            <a:r>
+              <a:rPr lang="en-US" noProof="0" dirty="0"/>
+              <a:t> </a:t>
+            </a:r>
+            <a:r>
+              <a:rPr lang="en-US" noProof="0" dirty="0" err="1"/>
+              <a:t>også</a:t>
+            </a:r>
+            <a:r>
+              <a:rPr lang="en-US" noProof="0" dirty="0"/>
+              <a:t> </a:t>
+            </a:r>
+            <a:r>
+              <a:rPr lang="en-US" noProof="0" dirty="0" err="1"/>
+              <a:t>mulig</a:t>
+            </a:r>
+            <a:r>
+              <a:rPr lang="en-US" noProof="0" dirty="0"/>
+              <a:t> å </a:t>
+            </a:r>
+            <a:r>
+              <a:rPr lang="en-US" noProof="0" dirty="0" err="1"/>
+              <a:t>tagge</a:t>
+            </a:r>
+            <a:r>
+              <a:rPr lang="en-US" noProof="0" dirty="0"/>
+              <a:t> </a:t>
+            </a:r>
+            <a:r>
+              <a:rPr lang="en-US" noProof="0" dirty="0" err="1"/>
+              <a:t>en</a:t>
+            </a:r>
+            <a:r>
+              <a:rPr lang="en-US" noProof="0" dirty="0"/>
+              <a:t> commit</a:t>
+            </a:r>
+            <a:endParaRPr lang="nb-NO" noProof="0" dirty="0"/>
+          </a:p>
+        </p:txBody>
+      </p:sp>
+      <p:sp>
+        <p:nvSpPr>
+          <p:cNvPr id="4" name="Slide Number Placeholder 3"/>
+          <p:cNvSpPr>
+            <a:spLocks noGrp="1"/>
+          </p:cNvSpPr>
+          <p:nvPr>
+            <p:ph type="sldNum" sz="quarter" idx="5"/>
+          </p:nvPr>
+        </p:nvSpPr>
+        <p:spPr/>
+        <p:txBody>
+          <a:bodyPr/>
+          <a:lstStyle/>
+          <a:p>
+            <a:fld id="{0DB4DFF7-1581-4E3B-BF7C-6E7C7A791C1B}" type="slidenum">
+              <a:rPr lang="nb-NO" smtClean="0"/>
+              <a:t>12</a:t>
+            </a:fld>
+            <a:endParaRPr lang="nb-NO"/>
+          </a:p>
+        </p:txBody>
+      </p:sp>
+    </p:spTree>
+    <p:extLst>
+      <p:ext uri="{BB962C8B-B14F-4D97-AF65-F5344CB8AC3E}">
+        <p14:creationId xmlns:p14="http://schemas.microsoft.com/office/powerpoint/2010/main" val="599962204"/>
+      </p:ext>
+    </p:extLst>
+  </p:cSld>
+  <p:clrMapOvr>
+    <a:masterClrMapping/>
+  </p:clrMapOvr>
+</p:notes>
 </file>
 
 <file path=ppt/slideLayouts/slideLayout1.xml><?xml version="1.0" encoding="utf-8"?>
@@ -5718,7 +7422,26 @@
                   </a:outerShdw>
                 </a:effectLst>
               </a:rPr>
-              <a:t>git</a:t>
+              <a:t>git </a:t>
+            </a:r>
+            <a:r>
+              <a:rPr lang="en-US" sz="7200" cap="none" dirty="0" err="1">
+                <a:effectLst>
+                  <a:glow rad="38100">
+                    <a:schemeClr val="bg1">
+                      <a:lumMod val="65000"/>
+                      <a:lumOff val="35000"/>
+                      <a:alpha val="50000"/>
+                    </a:schemeClr>
+                  </a:glow>
+                  <a:outerShdw blurRad="38100" dist="38100" dir="2700000" algn="tl">
+                    <a:srgbClr val="000000">
+                      <a:alpha val="43137"/>
+                    </a:srgbClr>
+                  </a:outerShdw>
+                </a:effectLst>
+              </a:rPr>
+              <a:t>init</a:t>
             </a:r>
             <a:endParaRPr lang="nb-NO" sz="7200" dirty="0"/>
           </a:p>
@@ -5781,10 +7504,165 @@
       </p:grpSpPr>
       <p:sp>
         <p:nvSpPr>
+          <p:cNvPr id="2" name="Title 1">
+            <a:extLst>
+              <a:ext uri="{FF2B5EF4-FFF2-40B4-BE49-F238E27FC236}">
+                <a16:creationId xmlns:a16="http://schemas.microsoft.com/office/drawing/2014/main" id="{F62250A5-D101-497F-8F98-D54D6E19F029}"/>
+              </a:ext>
+            </a:extLst>
+          </p:cNvPr>
+          <p:cNvSpPr>
+            <a:spLocks noGrp="1"/>
+          </p:cNvSpPr>
+          <p:nvPr>
+            <p:ph type="title"/>
+          </p:nvPr>
+        </p:nvSpPr>
+        <p:spPr>
+          <a:xfrm>
+            <a:off x="1141413" y="609600"/>
+            <a:ext cx="9905998" cy="742122"/>
+          </a:xfrm>
+        </p:spPr>
+        <p:txBody>
+          <a:bodyPr/>
+          <a:lstStyle/>
+          <a:p>
+            <a:r>
+              <a:rPr lang="nb-NO" dirty="0"/>
+              <a:t>GitHub</a:t>
+            </a:r>
+          </a:p>
+        </p:txBody>
+      </p:sp>
+      <p:pic>
+        <p:nvPicPr>
+          <p:cNvPr id="5" name="Content Placeholder 4">
+            <a:extLst>
+              <a:ext uri="{FF2B5EF4-FFF2-40B4-BE49-F238E27FC236}">
+                <a16:creationId xmlns:a16="http://schemas.microsoft.com/office/drawing/2014/main" id="{9686315F-DCDD-417B-AA12-124253FBDA41}"/>
+              </a:ext>
+            </a:extLst>
+          </p:cNvPr>
+          <p:cNvPicPr>
+            <a:picLocks noGrp="1" noChangeAspect="1"/>
+          </p:cNvPicPr>
+          <p:nvPr>
+            <p:ph sz="half" idx="1"/>
+          </p:nvPr>
+        </p:nvPicPr>
+        <p:blipFill>
+          <a:blip r:embed="rId3"/>
+          <a:stretch>
+            <a:fillRect/>
+          </a:stretch>
+        </p:blipFill>
+        <p:spPr>
+          <a:xfrm>
+            <a:off x="1042024" y="1741511"/>
+            <a:ext cx="4954586" cy="4049690"/>
+          </a:xfrm>
+          <a:prstGeom prst="rect">
+            <a:avLst/>
+          </a:prstGeom>
+        </p:spPr>
+      </p:pic>
+      <p:pic>
+        <p:nvPicPr>
+          <p:cNvPr id="6" name="Content Placeholder 5">
+            <a:extLst>
+              <a:ext uri="{FF2B5EF4-FFF2-40B4-BE49-F238E27FC236}">
+                <a16:creationId xmlns:a16="http://schemas.microsoft.com/office/drawing/2014/main" id="{EA6F95C9-378D-44EB-B011-2E3734FD9E44}"/>
+              </a:ext>
+            </a:extLst>
+          </p:cNvPr>
+          <p:cNvPicPr>
+            <a:picLocks noGrp="1" noChangeAspect="1"/>
+          </p:cNvPicPr>
+          <p:nvPr>
+            <p:ph sz="half" idx="2"/>
+          </p:nvPr>
+        </p:nvPicPr>
+        <p:blipFill>
+          <a:blip r:embed="rId4"/>
+          <a:stretch>
+            <a:fillRect/>
+          </a:stretch>
+        </p:blipFill>
+        <p:spPr>
+          <a:xfrm>
+            <a:off x="6192216" y="1741510"/>
+            <a:ext cx="4954586" cy="4049690"/>
+          </a:xfrm>
+          <a:prstGeom prst="rect">
+            <a:avLst/>
+          </a:prstGeom>
+        </p:spPr>
+      </p:pic>
+    </p:spTree>
+    <p:extLst>
+      <p:ext uri="{BB962C8B-B14F-4D97-AF65-F5344CB8AC3E}">
+        <p14:creationId xmlns:p14="http://schemas.microsoft.com/office/powerpoint/2010/main" val="3800677038"/>
+      </p:ext>
+    </p:extLst>
+  </p:cSld>
+  <p:clrMapOvr>
+    <a:masterClrMapping/>
+  </p:clrMapOvr>
+</p:sld>
+</file>
+
+<file path=ppt/slides/slide11.xml><?xml version="1.0" encoding="utf-8"?>
+<p:sld xmlns:a="http://schemas.openxmlformats.org/drawingml/2006/main" xmlns:r="http://schemas.openxmlformats.org/officeDocument/2006/relationships" xmlns:p="http://schemas.openxmlformats.org/presentationml/2006/main">
+  <p:cSld>
+    <p:spTree>
+      <p:nvGrpSpPr>
+        <p:cNvPr id="1" name=""/>
+        <p:cNvGrpSpPr/>
+        <p:nvPr/>
+      </p:nvGrpSpPr>
+      <p:grpSpPr>
+        <a:xfrm>
+          <a:off x="0" y="0"/>
+          <a:ext cx="0" cy="0"/>
+          <a:chOff x="0" y="0"/>
+          <a:chExt cx="0" cy="0"/>
+        </a:xfrm>
+      </p:grpSpPr>
+      <p:sp>
+        <p:nvSpPr>
+          <p:cNvPr id="2" name="Title 1">
+            <a:extLst>
+              <a:ext uri="{FF2B5EF4-FFF2-40B4-BE49-F238E27FC236}">
+                <a16:creationId xmlns:a16="http://schemas.microsoft.com/office/drawing/2014/main" id="{179789F9-7351-4CC6-AA85-457B7B8BA729}"/>
+              </a:ext>
+            </a:extLst>
+          </p:cNvPr>
+          <p:cNvSpPr>
+            <a:spLocks noGrp="1"/>
+          </p:cNvSpPr>
+          <p:nvPr>
+            <p:ph type="title"/>
+          </p:nvPr>
+        </p:nvSpPr>
+        <p:spPr/>
+        <p:txBody>
+          <a:bodyPr/>
+          <a:lstStyle/>
+          <a:p>
+            <a:r>
+              <a:rPr lang="nb-NO" dirty="0"/>
+              <a:t>Er git bare for kode?</a:t>
+            </a:r>
+          </a:p>
+        </p:txBody>
+      </p:sp>
+      <p:sp>
+        <p:nvSpPr>
           <p:cNvPr id="3" name="Content Placeholder 2">
             <a:extLst>
               <a:ext uri="{FF2B5EF4-FFF2-40B4-BE49-F238E27FC236}">
-                <a16:creationId xmlns:a16="http://schemas.microsoft.com/office/drawing/2014/main" id="{D2BD0C78-6071-4CE1-8D4B-2D25ABCE7886}"/>
+                <a16:creationId xmlns:a16="http://schemas.microsoft.com/office/drawing/2014/main" id="{D4F68470-CD0A-4284-849B-19E1AFC718F8}"/>
               </a:ext>
             </a:extLst>
           </p:cNvPr>
@@ -5797,39 +7675,509 @@
         </p:nvSpPr>
         <p:spPr>
           <a:xfrm>
-            <a:off x="1141413" y="1266739"/>
-            <a:ext cx="9905998" cy="4524462"/>
+            <a:off x="1141413" y="2666999"/>
+            <a:ext cx="9905998" cy="3124201"/>
           </a:xfrm>
         </p:spPr>
         <p:txBody>
           <a:bodyPr>
-            <a:normAutofit/>
+            <a:normAutofit fontScale="85000" lnSpcReduction="10000"/>
           </a:bodyPr>
           <a:lstStyle/>
           <a:p>
-            <a:pPr>
-              <a:buFontTx/>
-              <a:buChar char="-"/>
+            <a:r>
+              <a:rPr lang="nb-NO" dirty="0"/>
+              <a:t>Nei, Git kan brukes for mer enn bare kode</a:t>
+            </a:r>
+          </a:p>
+          <a:p>
+            <a:endParaRPr lang="nb-NO" dirty="0"/>
+          </a:p>
+          <a:p>
+            <a:r>
+              <a:rPr lang="nb-NO" dirty="0"/>
+              <a:t>Git kan brukes for alle typer dokumenter</a:t>
+            </a:r>
+          </a:p>
+          <a:p>
+            <a:pPr lvl="1"/>
+            <a:r>
+              <a:rPr lang="nb-NO" dirty="0"/>
+              <a:t>Nyttig for levende dokumenter</a:t>
+            </a:r>
+          </a:p>
+          <a:p>
+            <a:pPr lvl="1"/>
+            <a:r>
+              <a:rPr lang="nb-NO" dirty="0"/>
+              <a:t>Kan brukes som delingsmekanisme mellom flere som skal jobbe med dokumentet</a:t>
+            </a:r>
+          </a:p>
+          <a:p>
+            <a:pPr lvl="1"/>
+            <a:r>
+              <a:rPr lang="nb-NO" dirty="0"/>
+              <a:t>Forhindrer filkopier som versjonerings-mekanisme; avtale.docx, avtale_rev2.docx, avtale_rev3.docx</a:t>
+            </a:r>
+          </a:p>
+          <a:p>
+            <a:pPr lvl="1"/>
+            <a:r>
+              <a:rPr lang="nb-NO" dirty="0"/>
+              <a:t>En commit kan tagges for å enkelt finne tilbake til en versjon; «Sendt til kunde 22.11.18».</a:t>
+            </a:r>
+          </a:p>
+          <a:p>
+            <a:pPr marL="0" indent="0">
+              <a:buNone/>
             </a:pPr>
-            <a:r>
-              <a:rPr lang="en-US" sz="3200" dirty="0">
-                <a:effectLst/>
-              </a:rPr>
-              <a:t>“Git is the default version control provider for new projects. You should use Git for version control in your projects unless you have a specific need for centralized version control features in TFVC.” - Microsoft</a:t>
-            </a:r>
-          </a:p>
-          <a:p>
-            <a:pPr marL="0" indent="0">
-              <a:buNone/>
-            </a:pPr>
-            <a:endParaRPr lang="nb-NO" sz="3200" dirty="0"/>
+            <a:endParaRPr lang="nb-NO" dirty="0"/>
+          </a:p>
+          <a:p>
+            <a:r>
+              <a:rPr lang="nb-NO" dirty="0"/>
+              <a:t>Denne presentasjonen er under versjonskontroll og ligger på GitHub</a:t>
+            </a:r>
           </a:p>
         </p:txBody>
       </p:sp>
     </p:spTree>
     <p:extLst>
       <p:ext uri="{BB962C8B-B14F-4D97-AF65-F5344CB8AC3E}">
-        <p14:creationId xmlns:p14="http://schemas.microsoft.com/office/powerpoint/2010/main" val="1791791987"/>
+        <p14:creationId xmlns:p14="http://schemas.microsoft.com/office/powerpoint/2010/main" val="3137441122"/>
+      </p:ext>
+    </p:extLst>
+  </p:cSld>
+  <p:clrMapOvr>
+    <a:masterClrMapping/>
+  </p:clrMapOvr>
+</p:sld>
+</file>
+
+<file path=ppt/slides/slide12.xml><?xml version="1.0" encoding="utf-8"?>
+<p:sld xmlns:a="http://schemas.openxmlformats.org/drawingml/2006/main" xmlns:r="http://schemas.openxmlformats.org/officeDocument/2006/relationships" xmlns:p="http://schemas.openxmlformats.org/presentationml/2006/main">
+  <p:cSld>
+    <p:spTree>
+      <p:nvGrpSpPr>
+        <p:cNvPr id="1" name=""/>
+        <p:cNvGrpSpPr/>
+        <p:nvPr/>
+      </p:nvGrpSpPr>
+      <p:grpSpPr>
+        <a:xfrm>
+          <a:off x="0" y="0"/>
+          <a:ext cx="0" cy="0"/>
+          <a:chOff x="0" y="0"/>
+          <a:chExt cx="0" cy="0"/>
+        </a:xfrm>
+      </p:grpSpPr>
+      <p:pic>
+        <p:nvPicPr>
+          <p:cNvPr id="7" name="Content Placeholder 4">
+            <a:extLst>
+              <a:ext uri="{FF2B5EF4-FFF2-40B4-BE49-F238E27FC236}">
+                <a16:creationId xmlns:a16="http://schemas.microsoft.com/office/drawing/2014/main" id="{921A5119-DB21-41B8-AD1D-7669804B3BA1}"/>
+              </a:ext>
+            </a:extLst>
+          </p:cNvPr>
+          <p:cNvPicPr>
+            <a:picLocks noGrp="1" noChangeAspect="1"/>
+          </p:cNvPicPr>
+          <p:nvPr>
+            <p:ph sz="half" idx="2"/>
+          </p:nvPr>
+        </p:nvPicPr>
+        <p:blipFill>
+          <a:blip r:embed="rId3"/>
+          <a:stretch>
+            <a:fillRect/>
+          </a:stretch>
+        </p:blipFill>
+        <p:spPr>
+          <a:xfrm>
+            <a:off x="4325581" y="931303"/>
+            <a:ext cx="6812873" cy="1851653"/>
+          </a:xfrm>
+          <a:prstGeom prst="rect">
+            <a:avLst/>
+          </a:prstGeom>
+        </p:spPr>
+      </p:pic>
+      <p:pic>
+        <p:nvPicPr>
+          <p:cNvPr id="8" name="Content Placeholder 5">
+            <a:extLst>
+              <a:ext uri="{FF2B5EF4-FFF2-40B4-BE49-F238E27FC236}">
+                <a16:creationId xmlns:a16="http://schemas.microsoft.com/office/drawing/2014/main" id="{AAE058E5-F8F9-41AE-B0E8-3E414ACED20E}"/>
+              </a:ext>
+            </a:extLst>
+          </p:cNvPr>
+          <p:cNvPicPr>
+            <a:picLocks noGrp="1" noChangeAspect="1"/>
+          </p:cNvPicPr>
+          <p:nvPr>
+            <p:ph sz="quarter" idx="4"/>
+          </p:nvPr>
+        </p:nvPicPr>
+        <p:blipFill>
+          <a:blip r:embed="rId4"/>
+          <a:stretch>
+            <a:fillRect/>
+          </a:stretch>
+        </p:blipFill>
+        <p:spPr>
+          <a:xfrm>
+            <a:off x="4325580" y="3567375"/>
+            <a:ext cx="6812873" cy="2359322"/>
+          </a:xfrm>
+          <a:prstGeom prst="rect">
+            <a:avLst/>
+          </a:prstGeom>
+        </p:spPr>
+      </p:pic>
+      <p:pic>
+        <p:nvPicPr>
+          <p:cNvPr id="14" name="Picture 13">
+            <a:extLst>
+              <a:ext uri="{FF2B5EF4-FFF2-40B4-BE49-F238E27FC236}">
+                <a16:creationId xmlns:a16="http://schemas.microsoft.com/office/drawing/2014/main" id="{4FCA4711-7DFF-4EF6-943E-4448DD7A7A62}"/>
+              </a:ext>
+            </a:extLst>
+          </p:cNvPr>
+          <p:cNvPicPr>
+            <a:picLocks noChangeAspect="1"/>
+          </p:cNvPicPr>
+          <p:nvPr/>
+        </p:nvPicPr>
+        <p:blipFill>
+          <a:blip r:embed="rId5"/>
+          <a:stretch>
+            <a:fillRect/>
+          </a:stretch>
+        </p:blipFill>
+        <p:spPr>
+          <a:xfrm>
+            <a:off x="1053546" y="1010817"/>
+            <a:ext cx="1699354" cy="1699354"/>
+          </a:xfrm>
+          <a:prstGeom prst="rect">
+            <a:avLst/>
+          </a:prstGeom>
+        </p:spPr>
+      </p:pic>
+      <p:pic>
+        <p:nvPicPr>
+          <p:cNvPr id="16" name="Picture 15">
+            <a:extLst>
+              <a:ext uri="{FF2B5EF4-FFF2-40B4-BE49-F238E27FC236}">
+                <a16:creationId xmlns:a16="http://schemas.microsoft.com/office/drawing/2014/main" id="{57DE25F0-EA37-4C57-B137-6C04CDAC9FB6}"/>
+              </a:ext>
+            </a:extLst>
+          </p:cNvPr>
+          <p:cNvPicPr>
+            <a:picLocks noChangeAspect="1"/>
+          </p:cNvPicPr>
+          <p:nvPr/>
+        </p:nvPicPr>
+        <p:blipFill>
+          <a:blip r:embed="rId6"/>
+          <a:stretch>
+            <a:fillRect/>
+          </a:stretch>
+        </p:blipFill>
+        <p:spPr>
+          <a:xfrm>
+            <a:off x="1053546" y="3897358"/>
+            <a:ext cx="1699356" cy="1699356"/>
+          </a:xfrm>
+          <a:prstGeom prst="rect">
+            <a:avLst/>
+          </a:prstGeom>
+        </p:spPr>
+      </p:pic>
+    </p:spTree>
+    <p:extLst>
+      <p:ext uri="{BB962C8B-B14F-4D97-AF65-F5344CB8AC3E}">
+        <p14:creationId xmlns:p14="http://schemas.microsoft.com/office/powerpoint/2010/main" val="15826263"/>
+      </p:ext>
+    </p:extLst>
+  </p:cSld>
+  <p:clrMapOvr>
+    <a:masterClrMapping/>
+  </p:clrMapOvr>
+</p:sld>
+</file>
+
+<file path=ppt/slides/slide13.xml><?xml version="1.0" encoding="utf-8"?>
+<p:sld xmlns:a="http://schemas.openxmlformats.org/drawingml/2006/main" xmlns:r="http://schemas.openxmlformats.org/officeDocument/2006/relationships" xmlns:p="http://schemas.openxmlformats.org/presentationml/2006/main">
+  <p:cSld>
+    <p:spTree>
+      <p:nvGrpSpPr>
+        <p:cNvPr id="1" name=""/>
+        <p:cNvGrpSpPr/>
+        <p:nvPr/>
+      </p:nvGrpSpPr>
+      <p:grpSpPr>
+        <a:xfrm>
+          <a:off x="0" y="0"/>
+          <a:ext cx="0" cy="0"/>
+          <a:chOff x="0" y="0"/>
+          <a:chExt cx="0" cy="0"/>
+        </a:xfrm>
+      </p:grpSpPr>
+      <p:sp>
+        <p:nvSpPr>
+          <p:cNvPr id="2" name="Title 1">
+            <a:extLst>
+              <a:ext uri="{FF2B5EF4-FFF2-40B4-BE49-F238E27FC236}">
+                <a16:creationId xmlns:a16="http://schemas.microsoft.com/office/drawing/2014/main" id="{26A92845-865D-4EDA-87F6-3AACC01CD80A}"/>
+              </a:ext>
+            </a:extLst>
+          </p:cNvPr>
+          <p:cNvSpPr>
+            <a:spLocks noGrp="1"/>
+          </p:cNvSpPr>
+          <p:nvPr>
+            <p:ph type="title"/>
+          </p:nvPr>
+        </p:nvSpPr>
+        <p:spPr/>
+        <p:txBody>
+          <a:bodyPr/>
+          <a:lstStyle/>
+          <a:p>
+            <a:r>
+              <a:rPr lang="nb-NO" dirty="0"/>
+              <a:t>Oppsummering</a:t>
+            </a:r>
+          </a:p>
+        </p:txBody>
+      </p:sp>
+      <p:sp>
+        <p:nvSpPr>
+          <p:cNvPr id="3" name="Content Placeholder 2">
+            <a:extLst>
+              <a:ext uri="{FF2B5EF4-FFF2-40B4-BE49-F238E27FC236}">
+                <a16:creationId xmlns:a16="http://schemas.microsoft.com/office/drawing/2014/main" id="{94CAC104-0DEE-4986-BD43-E10D0915B4DF}"/>
+              </a:ext>
+            </a:extLst>
+          </p:cNvPr>
+          <p:cNvSpPr>
+            <a:spLocks noGrp="1"/>
+          </p:cNvSpPr>
+          <p:nvPr>
+            <p:ph idx="1"/>
+          </p:nvPr>
+        </p:nvSpPr>
+        <p:spPr/>
+        <p:txBody>
+          <a:bodyPr/>
+          <a:lstStyle/>
+          <a:p>
+            <a:r>
+              <a:rPr lang="nb-NO" dirty="0"/>
+              <a:t>Git != GitHub</a:t>
+            </a:r>
+          </a:p>
+          <a:p>
+            <a:r>
+              <a:rPr lang="nb-NO" dirty="0"/>
+              <a:t>Git har veldig bred støtte på tvers av verktøy og plattformer</a:t>
+            </a:r>
+          </a:p>
+          <a:p>
+            <a:r>
+              <a:rPr lang="nb-NO" dirty="0"/>
+              <a:t>Mange andre verktøy/tjenester har integrasjoner mot gi</a:t>
+            </a:r>
+          </a:p>
+          <a:p>
+            <a:r>
+              <a:rPr lang="nb-NO" dirty="0"/>
+              <a:t>Git kan brukes for mer enn bare kode</a:t>
+            </a:r>
+          </a:p>
+          <a:p>
+            <a:r>
+              <a:rPr lang="nb-NO" dirty="0"/>
+              <a:t>Git er ikke (så) skummelt</a:t>
+            </a:r>
+          </a:p>
+          <a:p>
+            <a:r>
+              <a:rPr lang="nb-NO" dirty="0"/>
+              <a:t>Microsoft omfavner Git</a:t>
+            </a:r>
+          </a:p>
+          <a:p>
+            <a:r>
+              <a:rPr lang="nb-NO" dirty="0"/>
+              <a:t>Git er utviklernes favoritt (kilde: </a:t>
+            </a:r>
+            <a:r>
+              <a:rPr lang="nb-NO" dirty="0" err="1"/>
+              <a:t>StackOverflow</a:t>
+            </a:r>
+            <a:r>
+              <a:rPr lang="nb-NO" dirty="0"/>
+              <a:t>, Google Trends)</a:t>
+            </a:r>
+          </a:p>
+        </p:txBody>
+      </p:sp>
+    </p:spTree>
+    <p:extLst>
+      <p:ext uri="{BB962C8B-B14F-4D97-AF65-F5344CB8AC3E}">
+        <p14:creationId xmlns:p14="http://schemas.microsoft.com/office/powerpoint/2010/main" val="4031235901"/>
+      </p:ext>
+    </p:extLst>
+  </p:cSld>
+  <p:clrMapOvr>
+    <a:masterClrMapping/>
+  </p:clrMapOvr>
+</p:sld>
+</file>
+
+<file path=ppt/slides/slide14.xml><?xml version="1.0" encoding="utf-8"?>
+<p:sld xmlns:a="http://schemas.openxmlformats.org/drawingml/2006/main" xmlns:r="http://schemas.openxmlformats.org/officeDocument/2006/relationships" xmlns:p="http://schemas.openxmlformats.org/presentationml/2006/main">
+  <p:cSld>
+    <p:spTree>
+      <p:nvGrpSpPr>
+        <p:cNvPr id="1" name=""/>
+        <p:cNvGrpSpPr/>
+        <p:nvPr/>
+      </p:nvGrpSpPr>
+      <p:grpSpPr>
+        <a:xfrm>
+          <a:off x="0" y="0"/>
+          <a:ext cx="0" cy="0"/>
+          <a:chOff x="0" y="0"/>
+          <a:chExt cx="0" cy="0"/>
+        </a:xfrm>
+      </p:grpSpPr>
+      <p:sp>
+        <p:nvSpPr>
+          <p:cNvPr id="2" name="Title 1">
+            <a:extLst>
+              <a:ext uri="{FF2B5EF4-FFF2-40B4-BE49-F238E27FC236}">
+                <a16:creationId xmlns:a16="http://schemas.microsoft.com/office/drawing/2014/main" id="{76033DE3-794C-4117-9976-C08C0BA68E70}"/>
+              </a:ext>
+            </a:extLst>
+          </p:cNvPr>
+          <p:cNvSpPr>
+            <a:spLocks noGrp="1"/>
+          </p:cNvSpPr>
+          <p:nvPr>
+            <p:ph type="title"/>
+          </p:nvPr>
+        </p:nvSpPr>
+        <p:spPr/>
+        <p:txBody>
+          <a:bodyPr>
+            <a:normAutofit fontScale="90000"/>
+          </a:bodyPr>
+          <a:lstStyle/>
+          <a:p>
+            <a:r>
+              <a:rPr lang="en-US" dirty="0">
+                <a:effectLst/>
+              </a:rPr>
+              <a:t>Git is the default version control provider for new projects. You should use Git for version control in your projects unless you have a specific need for centralized version control features in TFVC.</a:t>
+            </a:r>
+            <a:endParaRPr lang="nb-NO" dirty="0"/>
+          </a:p>
+        </p:txBody>
+      </p:sp>
+      <p:sp>
+        <p:nvSpPr>
+          <p:cNvPr id="3" name="Text Placeholder 2">
+            <a:extLst>
+              <a:ext uri="{FF2B5EF4-FFF2-40B4-BE49-F238E27FC236}">
+                <a16:creationId xmlns:a16="http://schemas.microsoft.com/office/drawing/2014/main" id="{AB0DA647-BE53-4278-B006-24BE901CF00D}"/>
+              </a:ext>
+            </a:extLst>
+          </p:cNvPr>
+          <p:cNvSpPr>
+            <a:spLocks noGrp="1"/>
+          </p:cNvSpPr>
+          <p:nvPr>
+            <p:ph type="body" sz="quarter" idx="13"/>
+          </p:nvPr>
+        </p:nvSpPr>
+        <p:spPr/>
+        <p:txBody>
+          <a:bodyPr/>
+          <a:lstStyle/>
+          <a:p>
+            <a:r>
+              <a:rPr lang="en-US" dirty="0">
+                <a:effectLst/>
+              </a:rPr>
+              <a:t>Microsoft</a:t>
+            </a:r>
+            <a:endParaRPr lang="nb-NO" dirty="0"/>
+          </a:p>
+        </p:txBody>
+      </p:sp>
+      <p:sp>
+        <p:nvSpPr>
+          <p:cNvPr id="4" name="Text Placeholder 3">
+            <a:extLst>
+              <a:ext uri="{FF2B5EF4-FFF2-40B4-BE49-F238E27FC236}">
+                <a16:creationId xmlns:a16="http://schemas.microsoft.com/office/drawing/2014/main" id="{D9FCD1A4-B36E-4148-8E06-490BC3379270}"/>
+              </a:ext>
+            </a:extLst>
+          </p:cNvPr>
+          <p:cNvSpPr>
+            <a:spLocks noGrp="1"/>
+          </p:cNvSpPr>
+          <p:nvPr>
+            <p:ph type="body" idx="1"/>
+          </p:nvPr>
+        </p:nvSpPr>
+        <p:spPr/>
+        <p:txBody>
+          <a:bodyPr/>
+          <a:lstStyle/>
+          <a:p>
+            <a:r>
+              <a:rPr lang="en-US" dirty="0" err="1"/>
+              <a:t>og</a:t>
+            </a:r>
+            <a:r>
+              <a:rPr lang="en-US" dirty="0"/>
+              <a:t> meg</a:t>
+            </a:r>
+          </a:p>
+          <a:p>
+            <a:r>
+              <a:rPr lang="en-US" dirty="0"/>
+              <a:t>…</a:t>
+            </a:r>
+            <a:r>
+              <a:rPr lang="en-US" dirty="0" err="1"/>
+              <a:t>og</a:t>
+            </a:r>
+            <a:r>
+              <a:rPr lang="en-US" dirty="0"/>
+              <a:t> </a:t>
+            </a:r>
+            <a:r>
+              <a:rPr lang="en-US" dirty="0" err="1"/>
+              <a:t>Informasjonskontroll</a:t>
+            </a:r>
+            <a:r>
+              <a:rPr lang="en-US" dirty="0"/>
+              <a:t>?</a:t>
+            </a:r>
+            <a:endParaRPr lang="nb-NO" dirty="0"/>
+          </a:p>
+        </p:txBody>
+      </p:sp>
+    </p:spTree>
+    <p:extLst>
+      <p:ext uri="{BB962C8B-B14F-4D97-AF65-F5344CB8AC3E}">
+        <p14:creationId xmlns:p14="http://schemas.microsoft.com/office/powerpoint/2010/main" val="3336596609"/>
       </p:ext>
     </p:extLst>
   </p:cSld>
@@ -5861,7 +8209,7 @@
           <p:cNvPr id="2" name="Title 1">
             <a:extLst>
               <a:ext uri="{FF2B5EF4-FFF2-40B4-BE49-F238E27FC236}">
-                <a16:creationId xmlns:a16="http://schemas.microsoft.com/office/drawing/2014/main" id="{BACDE8EB-A35D-41FB-B6AE-C4B6D4558F1E}"/>
+                <a16:creationId xmlns:a16="http://schemas.microsoft.com/office/drawing/2014/main" id="{67E00B34-A1E6-43CB-9E7E-D015E7DCB3C4}"/>
               </a:ext>
             </a:extLst>
           </p:cNvPr>
@@ -5869,60 +8217,27 @@
             <a:spLocks noGrp="1"/>
           </p:cNvSpPr>
           <p:nvPr>
-            <p:ph type="ctrTitle"/>
-          </p:nvPr>
-        </p:nvSpPr>
-        <p:spPr/>
-        <p:txBody>
-          <a:bodyPr>
-            <a:normAutofit/>
-          </a:bodyPr>
-          <a:lstStyle/>
-          <a:p>
-            <a:r>
-              <a:rPr lang="en-US" sz="7200" cap="none" dirty="0">
-                <a:effectLst>
-                  <a:glow rad="38100">
-                    <a:schemeClr val="bg1">
-                      <a:lumMod val="65000"/>
-                      <a:lumOff val="35000"/>
-                      <a:alpha val="50000"/>
-                    </a:schemeClr>
-                  </a:glow>
-                  <a:outerShdw blurRad="38100" dist="38100" dir="2700000" algn="tl">
-                    <a:srgbClr val="000000">
-                      <a:alpha val="43137"/>
-                    </a:srgbClr>
-                  </a:outerShdw>
-                </a:effectLst>
-              </a:rPr>
-              <a:t>git != GitHub</a:t>
-            </a:r>
-            <a:endParaRPr lang="nb-NO" sz="7200" cap="none" dirty="0">
-              <a:effectLst>
-                <a:glow rad="38100">
-                  <a:schemeClr val="bg1">
-                    <a:lumMod val="65000"/>
-                    <a:lumOff val="35000"/>
-                    <a:alpha val="50000"/>
-                  </a:schemeClr>
-                </a:glow>
-                <a:outerShdw blurRad="38100" dist="38100" dir="2700000" algn="tl">
-                  <a:srgbClr val="000000">
-                    <a:alpha val="43137"/>
-                  </a:srgbClr>
-                </a:outerShdw>
-              </a:effectLst>
-            </a:endParaRPr>
-          </a:p>
-        </p:txBody>
-      </p:sp>
-      <p:sp>
-        <p:nvSpPr>
-          <p:cNvPr id="3" name="Subtitle 2">
+            <p:ph type="title"/>
+          </p:nvPr>
+        </p:nvSpPr>
+        <p:spPr/>
+        <p:txBody>
+          <a:bodyPr/>
+          <a:lstStyle/>
+          <a:p>
+            <a:r>
+              <a:rPr lang="nb-NO" dirty="0"/>
+              <a:t>Om git</a:t>
+            </a:r>
+          </a:p>
+        </p:txBody>
+      </p:sp>
+      <p:sp>
+        <p:nvSpPr>
+          <p:cNvPr id="3" name="Content Placeholder 2">
             <a:extLst>
               <a:ext uri="{FF2B5EF4-FFF2-40B4-BE49-F238E27FC236}">
-                <a16:creationId xmlns:a16="http://schemas.microsoft.com/office/drawing/2014/main" id="{43B86EB3-0D6F-4168-AEE9-1D51B3BE9379}"/>
+                <a16:creationId xmlns:a16="http://schemas.microsoft.com/office/drawing/2014/main" id="{9BBB66E1-EBE3-4015-B5E9-DA3C790DCAA4}"/>
               </a:ext>
             </a:extLst>
           </p:cNvPr>
@@ -5930,7 +8245,7 @@
             <a:spLocks noGrp="1"/>
           </p:cNvSpPr>
           <p:nvPr>
-            <p:ph type="subTitle" idx="1"/>
+            <p:ph idx="1"/>
           </p:nvPr>
         </p:nvSpPr>
         <p:spPr/>
@@ -5938,6 +8253,56 @@
           <a:bodyPr/>
           <a:lstStyle/>
           <a:p>
+            <a:pPr>
+              <a:buFont typeface="Arial" panose="020B0604020202020204" pitchFamily="34" charset="0"/>
+              <a:buChar char="•"/>
+            </a:pPr>
+            <a:r>
+              <a:rPr lang="nb-NO" dirty="0"/>
+              <a:t>Git er et verktøy for versjonskontroll</a:t>
+            </a:r>
+          </a:p>
+          <a:p>
+            <a:pPr>
+              <a:buFont typeface="Arial" panose="020B0604020202020204" pitchFamily="34" charset="0"/>
+              <a:buChar char="•"/>
+            </a:pPr>
+            <a:r>
+              <a:rPr lang="nb-NO" dirty="0"/>
+              <a:t>Utviklet i 2005 av Linus Torvalds</a:t>
+            </a:r>
+          </a:p>
+          <a:p>
+            <a:pPr>
+              <a:buFont typeface="Arial" panose="020B0604020202020204" pitchFamily="34" charset="0"/>
+              <a:buChar char="•"/>
+            </a:pPr>
+            <a:r>
+              <a:rPr lang="nb-NO" dirty="0"/>
+              <a:t>Utviklet for versjonskontroll av Linux-kjernen</a:t>
+            </a:r>
+          </a:p>
+          <a:p>
+            <a:pPr>
+              <a:buFont typeface="Arial" panose="020B0604020202020204" pitchFamily="34" charset="0"/>
+              <a:buChar char="•"/>
+            </a:pPr>
+            <a:r>
+              <a:rPr lang="nb-NO" dirty="0"/>
+              <a:t>Gratis og </a:t>
+            </a:r>
+            <a:r>
+              <a:rPr lang="nb-NO" dirty="0" err="1"/>
+              <a:t>open</a:t>
+            </a:r>
+            <a:r>
+              <a:rPr lang="nb-NO" dirty="0"/>
+              <a:t> </a:t>
+            </a:r>
+            <a:r>
+              <a:rPr lang="nb-NO" dirty="0" err="1"/>
+              <a:t>source</a:t>
+            </a:r>
             <a:endParaRPr lang="nb-NO" dirty="0"/>
           </a:p>
         </p:txBody>
@@ -5945,7 +8310,7 @@
     </p:spTree>
     <p:extLst>
       <p:ext uri="{BB962C8B-B14F-4D97-AF65-F5344CB8AC3E}">
-        <p14:creationId xmlns:p14="http://schemas.microsoft.com/office/powerpoint/2010/main" val="3922845154"/>
+        <p14:creationId xmlns:p14="http://schemas.microsoft.com/office/powerpoint/2010/main" val="4278432553"/>
       </p:ext>
     </p:extLst>
   </p:cSld>
@@ -5977,7 +8342,7 @@
           <p:cNvPr id="2" name="Title 1">
             <a:extLst>
               <a:ext uri="{FF2B5EF4-FFF2-40B4-BE49-F238E27FC236}">
-                <a16:creationId xmlns:a16="http://schemas.microsoft.com/office/drawing/2014/main" id="{0742E060-A8C8-43EC-8EA9-FBE19D0DD269}"/>
+                <a16:creationId xmlns:a16="http://schemas.microsoft.com/office/drawing/2014/main" id="{365AAECB-14CB-4428-8AAA-18C947D2014F}"/>
               </a:ext>
             </a:extLst>
           </p:cNvPr>
@@ -5988,14 +8353,19 @@
             <p:ph type="title"/>
           </p:nvPr>
         </p:nvSpPr>
-        <p:spPr/>
+        <p:spPr>
+          <a:xfrm>
+            <a:off x="1141413" y="609600"/>
+            <a:ext cx="9905998" cy="1139687"/>
+          </a:xfrm>
+        </p:spPr>
         <p:txBody>
           <a:bodyPr/>
           <a:lstStyle/>
           <a:p>
             <a:r>
               <a:rPr lang="nb-NO" dirty="0"/>
-              <a:t>Distribuert vs. sentralisert</a:t>
+              <a:t>Git er ikke skummelt!</a:t>
             </a:r>
           </a:p>
         </p:txBody>
@@ -6005,7 +8375,7 @@
           <p:cNvPr id="3" name="Text Placeholder 2">
             <a:extLst>
               <a:ext uri="{FF2B5EF4-FFF2-40B4-BE49-F238E27FC236}">
-                <a16:creationId xmlns:a16="http://schemas.microsoft.com/office/drawing/2014/main" id="{DACA1DD6-808A-4CD1-AA9C-CE3F9E1DA16A}"/>
+                <a16:creationId xmlns:a16="http://schemas.microsoft.com/office/drawing/2014/main" id="{EC8F5CC9-8B15-4A7C-8A4F-3CB70BA8B945}"/>
               </a:ext>
             </a:extLst>
           </p:cNvPr>
@@ -6016,70 +8386,62 @@
             <p:ph type="body" idx="1"/>
           </p:nvPr>
         </p:nvSpPr>
-        <p:spPr/>
+        <p:spPr>
+          <a:xfrm>
+            <a:off x="712443" y="2063927"/>
+            <a:ext cx="5342511" cy="576262"/>
+          </a:xfrm>
+        </p:spPr>
         <p:txBody>
           <a:bodyPr/>
           <a:lstStyle/>
           <a:p>
+            <a:pPr algn="ctr"/>
             <a:r>
               <a:rPr lang="nb-NO" dirty="0"/>
-              <a:t>GIT - Distribuert</a:t>
-            </a:r>
-          </a:p>
-        </p:txBody>
-      </p:sp>
-      <p:sp>
-        <p:nvSpPr>
-          <p:cNvPr id="4" name="Content Placeholder 3">
+              <a:t>Ok, kanskje litt skummelt…</a:t>
+            </a:r>
+          </a:p>
+        </p:txBody>
+      </p:sp>
+      <p:pic>
+        <p:nvPicPr>
+          <p:cNvPr id="10" name="Content Placeholder 9">
             <a:extLst>
               <a:ext uri="{FF2B5EF4-FFF2-40B4-BE49-F238E27FC236}">
-                <a16:creationId xmlns:a16="http://schemas.microsoft.com/office/drawing/2014/main" id="{58165248-C694-4D85-A434-2D33076D7D74}"/>
+                <a16:creationId xmlns:a16="http://schemas.microsoft.com/office/drawing/2014/main" id="{7B9E3440-283B-41C8-97F9-43DD66B3D3EF}"/>
               </a:ext>
             </a:extLst>
           </p:cNvPr>
-          <p:cNvSpPr>
-            <a:spLocks noGrp="1"/>
-          </p:cNvSpPr>
+          <p:cNvPicPr>
+            <a:picLocks noGrp="1" noChangeAspect="1"/>
+          </p:cNvPicPr>
           <p:nvPr>
             <p:ph sz="half" idx="2"/>
           </p:nvPr>
-        </p:nvSpPr>
-        <p:spPr/>
-        <p:txBody>
-          <a:bodyPr/>
-          <a:lstStyle/>
-          <a:p>
-            <a:r>
-              <a:rPr lang="nb-NO"/>
-              <a:t>Hver uvikler har en komplett kopi av hele kildekoden og all historikk</a:t>
-            </a:r>
-          </a:p>
-          <a:p>
-            <a:r>
-              <a:rPr lang="nb-NO"/>
-              <a:t>Gjør det mulig å se historikk og sammenligne versjoner selv uten internettforbindelse</a:t>
-            </a:r>
-          </a:p>
-          <a:p>
-            <a:r>
-              <a:rPr lang="nb-NO"/>
-              <a:t>Lokale brancher</a:t>
-            </a:r>
-          </a:p>
-          <a:p>
-            <a:r>
-              <a:rPr lang="nb-NO"/>
-              <a:t>Enklere å jobbed med brancher</a:t>
-            </a:r>
-          </a:p>
-        </p:txBody>
-      </p:sp>
+        </p:nvPicPr>
+        <p:blipFill>
+          <a:blip r:embed="rId3"/>
+          <a:stretch>
+            <a:fillRect/>
+          </a:stretch>
+        </p:blipFill>
+        <p:spPr>
+          <a:xfrm>
+            <a:off x="715618" y="2777131"/>
+            <a:ext cx="5342512" cy="3402288"/>
+          </a:xfrm>
+          <a:prstGeom prst="rect">
+            <a:avLst/>
+          </a:prstGeom>
+        </p:spPr>
+      </p:pic>
       <p:sp>
         <p:nvSpPr>
           <p:cNvPr id="5" name="Text Placeholder 4">
             <a:extLst>
               <a:ext uri="{FF2B5EF4-FFF2-40B4-BE49-F238E27FC236}">
-                <a16:creationId xmlns:a16="http://schemas.microsoft.com/office/drawing/2014/main" id="{704ED4F9-DEF2-48BB-91A2-26A7C9619225}"/>
+                <a16:creationId xmlns:a16="http://schemas.microsoft.com/office/drawing/2014/main" id="{387AB75E-2E9E-4D00-9FBE-6CDD75E0FE0B}"/>
               </a:ext>
             </a:extLst>
           </p:cNvPr>
@@ -6090,68 +8452,60 @@
             <p:ph type="body" sz="quarter" idx="3"/>
           </p:nvPr>
         </p:nvSpPr>
-        <p:spPr/>
+        <p:spPr>
+          <a:xfrm>
+            <a:off x="6443130" y="2063927"/>
+            <a:ext cx="5033251" cy="576262"/>
+          </a:xfrm>
+        </p:spPr>
         <p:txBody>
           <a:bodyPr/>
           <a:lstStyle/>
           <a:p>
+            <a:pPr algn="ctr"/>
             <a:r>
               <a:rPr lang="nb-NO" dirty="0"/>
-              <a:t>TFS - Sentralisert</a:t>
-            </a:r>
-          </a:p>
-        </p:txBody>
-      </p:sp>
-      <p:sp>
-        <p:nvSpPr>
-          <p:cNvPr id="6" name="Content Placeholder 5">
+              <a:t>…men ikke nødvendigvis</a:t>
+            </a:r>
+          </a:p>
+        </p:txBody>
+      </p:sp>
+      <p:pic>
+        <p:nvPicPr>
+          <p:cNvPr id="11" name="Content Placeholder 10">
             <a:extLst>
               <a:ext uri="{FF2B5EF4-FFF2-40B4-BE49-F238E27FC236}">
-                <a16:creationId xmlns:a16="http://schemas.microsoft.com/office/drawing/2014/main" id="{BC10B897-3AC3-4443-B9AA-3A8869D91CED}"/>
+                <a16:creationId xmlns:a16="http://schemas.microsoft.com/office/drawing/2014/main" id="{6BB0F6FA-5333-4DED-B6AD-81D8853E3DF7}"/>
               </a:ext>
             </a:extLst>
           </p:cNvPr>
-          <p:cNvSpPr>
-            <a:spLocks noGrp="1"/>
-          </p:cNvSpPr>
+          <p:cNvPicPr>
+            <a:picLocks noGrp="1" noChangeAspect="1"/>
+          </p:cNvPicPr>
           <p:nvPr>
             <p:ph sz="quarter" idx="4"/>
           </p:nvPr>
-        </p:nvSpPr>
-        <p:spPr/>
-        <p:txBody>
-          <a:bodyPr/>
-          <a:lstStyle/>
-          <a:p>
-            <a:r>
-              <a:rPr lang="nb-NO"/>
-              <a:t>Hver utvikler har bare én versjon av kildekoden lokalt</a:t>
-            </a:r>
-          </a:p>
-          <a:p>
-            <a:r>
-              <a:rPr lang="nb-NO"/>
-              <a:t>Historikk er kun tilgjengelig fra server</a:t>
-            </a:r>
-          </a:p>
-          <a:p>
-            <a:r>
-              <a:rPr lang="nb-NO"/>
-              <a:t>Brancher må lages på serveren</a:t>
-            </a:r>
-          </a:p>
-          <a:p>
-            <a:r>
-              <a:rPr lang="nb-NO"/>
-              <a:t>Mye mer avhengig av å være tilkoblet serveren</a:t>
-            </a:r>
-          </a:p>
-        </p:txBody>
-      </p:sp>
+        </p:nvPicPr>
+        <p:blipFill>
+          <a:blip r:embed="rId4"/>
+          <a:stretch>
+            <a:fillRect/>
+          </a:stretch>
+        </p:blipFill>
+        <p:spPr>
+          <a:xfrm>
+            <a:off x="6443130" y="2765777"/>
+            <a:ext cx="5033251" cy="3413642"/>
+          </a:xfrm>
+          <a:prstGeom prst="rect">
+            <a:avLst/>
+          </a:prstGeom>
+        </p:spPr>
+      </p:pic>
     </p:spTree>
     <p:extLst>
       <p:ext uri="{BB962C8B-B14F-4D97-AF65-F5344CB8AC3E}">
-        <p14:creationId xmlns:p14="http://schemas.microsoft.com/office/powerpoint/2010/main" val="186451628"/>
+        <p14:creationId xmlns:p14="http://schemas.microsoft.com/office/powerpoint/2010/main" val="2767258595"/>
       </p:ext>
     </p:extLst>
   </p:cSld>
@@ -6183,7 +8537,7 @@
           <p:cNvPr id="2" name="Title 1">
             <a:extLst>
               <a:ext uri="{FF2B5EF4-FFF2-40B4-BE49-F238E27FC236}">
-                <a16:creationId xmlns:a16="http://schemas.microsoft.com/office/drawing/2014/main" id="{B1CBD927-EA4E-414C-AD54-5A0FACAEDF00}"/>
+                <a16:creationId xmlns:a16="http://schemas.microsoft.com/office/drawing/2014/main" id="{BACDE8EB-A35D-41FB-B6AE-C4B6D4558F1E}"/>
               </a:ext>
             </a:extLst>
           </p:cNvPr>
@@ -6191,27 +8545,60 @@
             <a:spLocks noGrp="1"/>
           </p:cNvSpPr>
           <p:nvPr>
-            <p:ph type="title"/>
-          </p:nvPr>
-        </p:nvSpPr>
-        <p:spPr/>
-        <p:txBody>
-          <a:bodyPr/>
-          <a:lstStyle/>
-          <a:p>
-            <a:r>
-              <a:rPr lang="nb-NO" dirty="0"/>
-              <a:t>Git i Visual Studio</a:t>
-            </a:r>
-          </a:p>
-        </p:txBody>
-      </p:sp>
-      <p:sp>
-        <p:nvSpPr>
-          <p:cNvPr id="3" name="Content Placeholder 2">
+            <p:ph type="ctrTitle"/>
+          </p:nvPr>
+        </p:nvSpPr>
+        <p:spPr/>
+        <p:txBody>
+          <a:bodyPr>
+            <a:normAutofit/>
+          </a:bodyPr>
+          <a:lstStyle/>
+          <a:p>
+            <a:r>
+              <a:rPr lang="en-US" cap="none" dirty="0">
+                <a:effectLst>
+                  <a:glow rad="38100">
+                    <a:schemeClr val="bg1">
+                      <a:lumMod val="65000"/>
+                      <a:lumOff val="35000"/>
+                      <a:alpha val="50000"/>
+                    </a:schemeClr>
+                  </a:glow>
+                  <a:outerShdw blurRad="38100" dist="38100" dir="2700000" algn="tl">
+                    <a:srgbClr val="000000">
+                      <a:alpha val="43137"/>
+                    </a:srgbClr>
+                  </a:outerShdw>
+                </a:effectLst>
+              </a:rPr>
+              <a:t>git != GitHub</a:t>
+            </a:r>
+            <a:endParaRPr lang="nb-NO" cap="none" dirty="0">
+              <a:effectLst>
+                <a:glow rad="38100">
+                  <a:schemeClr val="bg1">
+                    <a:lumMod val="65000"/>
+                    <a:lumOff val="35000"/>
+                    <a:alpha val="50000"/>
+                  </a:schemeClr>
+                </a:glow>
+                <a:outerShdw blurRad="38100" dist="38100" dir="2700000" algn="tl">
+                  <a:srgbClr val="000000">
+                    <a:alpha val="43137"/>
+                  </a:srgbClr>
+                </a:outerShdw>
+              </a:effectLst>
+            </a:endParaRPr>
+          </a:p>
+        </p:txBody>
+      </p:sp>
+      <p:sp>
+        <p:nvSpPr>
+          <p:cNvPr id="3" name="Subtitle 2">
             <a:extLst>
               <a:ext uri="{FF2B5EF4-FFF2-40B4-BE49-F238E27FC236}">
-                <a16:creationId xmlns:a16="http://schemas.microsoft.com/office/drawing/2014/main" id="{FF95AD81-2D86-4432-A2B9-A0B19D7E5BE5}"/>
+                <a16:creationId xmlns:a16="http://schemas.microsoft.com/office/drawing/2014/main" id="{43B86EB3-0D6F-4168-AEE9-1D51B3BE9379}"/>
               </a:ext>
             </a:extLst>
           </p:cNvPr>
@@ -6219,75 +8606,13 @@
             <a:spLocks noGrp="1"/>
           </p:cNvSpPr>
           <p:nvPr>
-            <p:ph idx="1"/>
-          </p:nvPr>
-        </p:nvSpPr>
-        <p:spPr/>
-        <p:txBody>
-          <a:bodyPr>
-            <a:normAutofit fontScale="92500" lnSpcReduction="20000"/>
-          </a:bodyPr>
-          <a:lstStyle/>
-          <a:p>
-            <a:r>
-              <a:rPr lang="nb-NO" dirty="0"/>
-              <a:t>Visual Studio har integrert støtte for git (f.o.m. VS 2013)</a:t>
-            </a:r>
-          </a:p>
-          <a:p>
-            <a:pPr lvl="1"/>
-            <a:r>
-              <a:rPr lang="nb-NO" dirty="0"/>
-              <a:t>Branches</a:t>
-            </a:r>
-          </a:p>
-          <a:p>
-            <a:pPr lvl="1"/>
-            <a:r>
-              <a:rPr lang="nb-NO" dirty="0"/>
-              <a:t>Push, Pull</a:t>
-            </a:r>
-          </a:p>
-          <a:p>
-            <a:pPr lvl="1"/>
-            <a:r>
-              <a:rPr lang="nb-NO" dirty="0"/>
-              <a:t>Commit</a:t>
-            </a:r>
-          </a:p>
-          <a:p>
-            <a:pPr lvl="1"/>
-            <a:r>
-              <a:rPr lang="nb-NO" dirty="0"/>
-              <a:t>Merge</a:t>
-            </a:r>
-          </a:p>
-          <a:p>
-            <a:pPr lvl="1"/>
-            <a:r>
-              <a:rPr lang="nb-NO" dirty="0"/>
-              <a:t>History, Compare</a:t>
-            </a:r>
-          </a:p>
-          <a:p>
-            <a:pPr lvl="1"/>
-            <a:r>
-              <a:rPr lang="nb-NO" dirty="0"/>
-              <a:t>Code Lense-integrasjon</a:t>
-            </a:r>
-          </a:p>
-          <a:p>
-            <a:pPr marL="457200" lvl="1" indent="0">
-              <a:buNone/>
-            </a:pPr>
-            <a:endParaRPr lang="nb-NO" dirty="0"/>
-          </a:p>
-          <a:p>
-            <a:r>
-              <a:rPr lang="nb-NO" dirty="0"/>
-              <a:t>Visual Studio bruker git som standard kildekontroll ved opprettelse av nye prosjekter</a:t>
-            </a:r>
-          </a:p>
+            <p:ph type="subTitle" idx="1"/>
+          </p:nvPr>
+        </p:nvSpPr>
+        <p:spPr/>
+        <p:txBody>
+          <a:bodyPr/>
+          <a:lstStyle/>
           <a:p>
             <a:endParaRPr lang="nb-NO" dirty="0"/>
           </a:p>
@@ -6296,7 +8621,7 @@
     </p:spTree>
     <p:extLst>
       <p:ext uri="{BB962C8B-B14F-4D97-AF65-F5344CB8AC3E}">
-        <p14:creationId xmlns:p14="http://schemas.microsoft.com/office/powerpoint/2010/main" val="2905875814"/>
+        <p14:creationId xmlns:p14="http://schemas.microsoft.com/office/powerpoint/2010/main" val="3922845154"/>
       </p:ext>
     </p:extLst>
   </p:cSld>
@@ -6328,7 +8653,7 @@
           <p:cNvPr id="2" name="Title 1">
             <a:extLst>
               <a:ext uri="{FF2B5EF4-FFF2-40B4-BE49-F238E27FC236}">
-                <a16:creationId xmlns:a16="http://schemas.microsoft.com/office/drawing/2014/main" id="{FAFD36D3-4DC7-4ED1-96C3-7A2E2F9E194A}"/>
+                <a16:creationId xmlns:a16="http://schemas.microsoft.com/office/drawing/2014/main" id="{B64B6CF8-0405-41FB-8F51-EF3B3BF37F50}"/>
               </a:ext>
             </a:extLst>
           </p:cNvPr>
@@ -6336,7 +8661,7 @@
             <a:spLocks noGrp="1"/>
           </p:cNvSpPr>
           <p:nvPr>
-            <p:ph type="title"/>
+            <p:ph type="ctrTitle"/>
           </p:nvPr>
         </p:nvSpPr>
         <p:spPr/>
@@ -6345,18 +8670,19 @@
           <a:lstStyle/>
           <a:p>
             <a:r>
-              <a:rPr lang="nb-NO" dirty="0"/>
-              <a:t>Git-klienter</a:t>
-            </a:r>
-          </a:p>
-        </p:txBody>
-      </p:sp>
-      <p:sp>
-        <p:nvSpPr>
-          <p:cNvPr id="3" name="Content Placeholder 2">
+              <a:rPr lang="en-US" cap="none" dirty="0"/>
+              <a:t>git vs. TFS</a:t>
+            </a:r>
+            <a:endParaRPr lang="nb-NO" cap="none" dirty="0"/>
+          </a:p>
+        </p:txBody>
+      </p:sp>
+      <p:sp>
+        <p:nvSpPr>
+          <p:cNvPr id="3" name="Subtitle 2">
             <a:extLst>
               <a:ext uri="{FF2B5EF4-FFF2-40B4-BE49-F238E27FC236}">
-                <a16:creationId xmlns:a16="http://schemas.microsoft.com/office/drawing/2014/main" id="{1A1C14BF-CE39-43FA-9C4F-E4EF7CF63950}"/>
+                <a16:creationId xmlns:a16="http://schemas.microsoft.com/office/drawing/2014/main" id="{5FFAF33C-C3E3-4729-AD05-6022529E9C2D}"/>
               </a:ext>
             </a:extLst>
           </p:cNvPr>
@@ -6364,109 +8690,22 @@
             <a:spLocks noGrp="1"/>
           </p:cNvSpPr>
           <p:nvPr>
-            <p:ph idx="1"/>
-          </p:nvPr>
-        </p:nvSpPr>
-        <p:spPr>
-          <a:xfrm>
-            <a:off x="1141413" y="2514599"/>
-            <a:ext cx="9905998" cy="4079147"/>
-          </a:xfrm>
-        </p:spPr>
-        <p:txBody>
-          <a:bodyPr>
-            <a:normAutofit fontScale="92500" lnSpcReduction="20000"/>
-          </a:bodyPr>
-          <a:lstStyle/>
-          <a:p>
-            <a:r>
-              <a:rPr lang="nb-NO" dirty="0"/>
-              <a:t>De fleste andre IDE’er har </a:t>
-            </a:r>
-            <a:r>
-              <a:rPr lang="nb-NO" sz="2600" dirty="0"/>
-              <a:t>integrert</a:t>
-            </a:r>
-            <a:r>
-              <a:rPr lang="nb-NO" dirty="0"/>
-              <a:t> støtte for Git</a:t>
-            </a:r>
-          </a:p>
-          <a:p>
-            <a:pPr lvl="1"/>
-            <a:r>
-              <a:rPr lang="nb-NO" dirty="0"/>
-              <a:t>VS Code, VS for Mac, Android Studio, Xcode, Eclipse, IntelliJ-baserte IDE’er</a:t>
-            </a:r>
-          </a:p>
-          <a:p>
-            <a:pPr marL="457200" lvl="1" indent="0">
-              <a:buNone/>
-            </a:pPr>
-            <a:endParaRPr lang="nb-NO" dirty="0"/>
-          </a:p>
-          <a:p>
-            <a:r>
-              <a:rPr lang="nb-NO" dirty="0"/>
-              <a:t>git - kommandolinjeverktøy for Windows, Mac og Linux</a:t>
-            </a:r>
-          </a:p>
-          <a:p>
-            <a:r>
-              <a:rPr lang="nb-NO" dirty="0"/>
-              <a:t>git-gui – offisiell GUI-klient</a:t>
-            </a:r>
-          </a:p>
-          <a:p>
-            <a:pPr marL="0" indent="0">
-              <a:buNone/>
-            </a:pPr>
-            <a:endParaRPr lang="nb-NO" dirty="0"/>
-          </a:p>
-          <a:p>
-            <a:r>
-              <a:rPr lang="nb-NO" dirty="0"/>
-              <a:t>Mange tredjepartsprogrammer med GUI</a:t>
-            </a:r>
-          </a:p>
-          <a:p>
-            <a:pPr lvl="1"/>
-            <a:r>
-              <a:rPr lang="nb-NO" dirty="0"/>
-              <a:t>GitKraken (Windows, Mac, Linux) (ANBEFALES!)</a:t>
-            </a:r>
-          </a:p>
-          <a:p>
-            <a:pPr lvl="1"/>
-            <a:r>
-              <a:rPr lang="nb-NO" dirty="0"/>
-              <a:t>SourceTree (Windows, Mac)</a:t>
-            </a:r>
-          </a:p>
-          <a:p>
-            <a:pPr lvl="1"/>
-            <a:r>
-              <a:rPr lang="nb-NO" dirty="0"/>
-              <a:t>GitHub Desktop (Windows, Mac)</a:t>
-            </a:r>
-          </a:p>
-          <a:p>
-            <a:pPr lvl="1"/>
-            <a:r>
-              <a:rPr lang="nb-NO" dirty="0"/>
-              <a:t>++</a:t>
-            </a:r>
-          </a:p>
-          <a:p>
-            <a:pPr lvl="1"/>
-            <a:endParaRPr lang="nb-NO" dirty="0"/>
+            <p:ph type="subTitle" idx="1"/>
+          </p:nvPr>
+        </p:nvSpPr>
+        <p:spPr/>
+        <p:txBody>
+          <a:bodyPr/>
+          <a:lstStyle/>
+          <a:p>
+            <a:endParaRPr lang="nb-NO"/>
           </a:p>
         </p:txBody>
       </p:sp>
     </p:spTree>
     <p:extLst>
       <p:ext uri="{BB962C8B-B14F-4D97-AF65-F5344CB8AC3E}">
-        <p14:creationId xmlns:p14="http://schemas.microsoft.com/office/powerpoint/2010/main" val="3041288103"/>
+        <p14:creationId xmlns:p14="http://schemas.microsoft.com/office/powerpoint/2010/main" val="3715827027"/>
       </p:ext>
     </p:extLst>
   </p:cSld>
@@ -6498,7 +8737,7 @@
           <p:cNvPr id="2" name="Title 1">
             <a:extLst>
               <a:ext uri="{FF2B5EF4-FFF2-40B4-BE49-F238E27FC236}">
-                <a16:creationId xmlns:a16="http://schemas.microsoft.com/office/drawing/2014/main" id="{A31E238B-79DC-46FC-874A-ABD829766AFC}"/>
+                <a16:creationId xmlns:a16="http://schemas.microsoft.com/office/drawing/2014/main" id="{0742E060-A8C8-43EC-8EA9-FBE19D0DD269}"/>
               </a:ext>
             </a:extLst>
           </p:cNvPr>
@@ -6516,17 +8755,17 @@
           <a:p>
             <a:r>
               <a:rPr lang="nb-NO" dirty="0"/>
-              <a:t>Git Hosting</a:t>
-            </a:r>
-          </a:p>
-        </p:txBody>
-      </p:sp>
-      <p:sp>
-        <p:nvSpPr>
-          <p:cNvPr id="3" name="Content Placeholder 2">
+              <a:t>Distribuert vs. sentralisert</a:t>
+            </a:r>
+          </a:p>
+        </p:txBody>
+      </p:sp>
+      <p:sp>
+        <p:nvSpPr>
+          <p:cNvPr id="3" name="Text Placeholder 2">
             <a:extLst>
               <a:ext uri="{FF2B5EF4-FFF2-40B4-BE49-F238E27FC236}">
-                <a16:creationId xmlns:a16="http://schemas.microsoft.com/office/drawing/2014/main" id="{67570771-BA8F-449C-9729-AB92FB705E57}"/>
+                <a16:creationId xmlns:a16="http://schemas.microsoft.com/office/drawing/2014/main" id="{DACA1DD6-808A-4CD1-AA9C-CE3F9E1DA16A}"/>
               </a:ext>
             </a:extLst>
           </p:cNvPr>
@@ -6534,49 +8773,137 @@
             <a:spLocks noGrp="1"/>
           </p:cNvSpPr>
           <p:nvPr>
-            <p:ph idx="1"/>
-          </p:nvPr>
-        </p:nvSpPr>
-        <p:spPr>
-          <a:xfrm>
-            <a:off x="1141413" y="2666999"/>
-            <a:ext cx="9905998" cy="3124201"/>
-          </a:xfrm>
-        </p:spPr>
+            <p:ph type="body" idx="1"/>
+          </p:nvPr>
+        </p:nvSpPr>
+        <p:spPr/>
         <p:txBody>
           <a:bodyPr/>
           <a:lstStyle/>
           <a:p>
             <a:r>
               <a:rPr lang="nb-NO" dirty="0"/>
-              <a:t>GitHub</a:t>
-            </a:r>
-          </a:p>
+              <a:t>GIT - Distribuert</a:t>
+            </a:r>
+          </a:p>
+        </p:txBody>
+      </p:sp>
+      <p:sp>
+        <p:nvSpPr>
+          <p:cNvPr id="4" name="Content Placeholder 3">
+            <a:extLst>
+              <a:ext uri="{FF2B5EF4-FFF2-40B4-BE49-F238E27FC236}">
+                <a16:creationId xmlns:a16="http://schemas.microsoft.com/office/drawing/2014/main" id="{58165248-C694-4D85-A434-2D33076D7D74}"/>
+              </a:ext>
+            </a:extLst>
+          </p:cNvPr>
+          <p:cNvSpPr>
+            <a:spLocks noGrp="1"/>
+          </p:cNvSpPr>
+          <p:nvPr>
+            <p:ph sz="half" idx="2"/>
+          </p:nvPr>
+        </p:nvSpPr>
+        <p:spPr/>
+        <p:txBody>
+          <a:bodyPr/>
+          <a:lstStyle/>
           <a:p>
             <a:r>
               <a:rPr lang="nb-NO" dirty="0"/>
-              <a:t>GitLab</a:t>
+              <a:t>Hver utvikler har en komplett kopi av hele kildekoden og all historikk</a:t>
             </a:r>
           </a:p>
           <a:p>
             <a:r>
               <a:rPr lang="nb-NO" dirty="0"/>
-              <a:t>BitBucket</a:t>
+              <a:t>Gjør det mulig å se historikk og sammenligne versjoner selv uten internettforbindelse</a:t>
             </a:r>
           </a:p>
           <a:p>
             <a:r>
               <a:rPr lang="nb-NO" dirty="0"/>
-              <a:t>VSTS (Azure DevOps)</a:t>
-            </a:r>
-          </a:p>
-          <a:p>
-            <a:endParaRPr lang="nb-NO" dirty="0"/>
+              <a:t>Lokale brancher</a:t>
+            </a:r>
           </a:p>
           <a:p>
             <a:r>
               <a:rPr lang="nb-NO" dirty="0"/>
-              <a:t>SaaS eller Enterprise-installasjon på egne servere</a:t>
+              <a:t>Enklere å jobbe med brancher</a:t>
+            </a:r>
+          </a:p>
+        </p:txBody>
+      </p:sp>
+      <p:sp>
+        <p:nvSpPr>
+          <p:cNvPr id="5" name="Text Placeholder 4">
+            <a:extLst>
+              <a:ext uri="{FF2B5EF4-FFF2-40B4-BE49-F238E27FC236}">
+                <a16:creationId xmlns:a16="http://schemas.microsoft.com/office/drawing/2014/main" id="{704ED4F9-DEF2-48BB-91A2-26A7C9619225}"/>
+              </a:ext>
+            </a:extLst>
+          </p:cNvPr>
+          <p:cNvSpPr>
+            <a:spLocks noGrp="1"/>
+          </p:cNvSpPr>
+          <p:nvPr>
+            <p:ph type="body" sz="quarter" idx="3"/>
+          </p:nvPr>
+        </p:nvSpPr>
+        <p:spPr/>
+        <p:txBody>
+          <a:bodyPr/>
+          <a:lstStyle/>
+          <a:p>
+            <a:r>
+              <a:rPr lang="nb-NO" dirty="0"/>
+              <a:t>TFS - Sentralisert</a:t>
+            </a:r>
+          </a:p>
+        </p:txBody>
+      </p:sp>
+      <p:sp>
+        <p:nvSpPr>
+          <p:cNvPr id="6" name="Content Placeholder 5">
+            <a:extLst>
+              <a:ext uri="{FF2B5EF4-FFF2-40B4-BE49-F238E27FC236}">
+                <a16:creationId xmlns:a16="http://schemas.microsoft.com/office/drawing/2014/main" id="{BC10B897-3AC3-4443-B9AA-3A8869D91CED}"/>
+              </a:ext>
+            </a:extLst>
+          </p:cNvPr>
+          <p:cNvSpPr>
+            <a:spLocks noGrp="1"/>
+          </p:cNvSpPr>
+          <p:nvPr>
+            <p:ph sz="quarter" idx="4"/>
+          </p:nvPr>
+        </p:nvSpPr>
+        <p:spPr/>
+        <p:txBody>
+          <a:bodyPr/>
+          <a:lstStyle/>
+          <a:p>
+            <a:r>
+              <a:rPr lang="nb-NO" dirty="0"/>
+              <a:t>Hver utvikler har bare én versjon av kildekoden lokalt</a:t>
+            </a:r>
+          </a:p>
+          <a:p>
+            <a:r>
+              <a:rPr lang="nb-NO" dirty="0"/>
+              <a:t>Historikk er kun tilgjengelig fra server</a:t>
+            </a:r>
+          </a:p>
+          <a:p>
+            <a:r>
+              <a:rPr lang="nb-NO" dirty="0"/>
+              <a:t>Brancher må lages på serveren</a:t>
+            </a:r>
+          </a:p>
+          <a:p>
+            <a:r>
+              <a:rPr lang="nb-NO" dirty="0"/>
+              <a:t>Mye mer avhengig av å være tilkoblet serveren</a:t>
             </a:r>
           </a:p>
         </p:txBody>
@@ -6584,7 +8911,7 @@
     </p:spTree>
     <p:extLst>
       <p:ext uri="{BB962C8B-B14F-4D97-AF65-F5344CB8AC3E}">
-        <p14:creationId xmlns:p14="http://schemas.microsoft.com/office/powerpoint/2010/main" val="3840197391"/>
+        <p14:creationId xmlns:p14="http://schemas.microsoft.com/office/powerpoint/2010/main" val="186451628"/>
       </p:ext>
     </p:extLst>
   </p:cSld>
@@ -6616,7 +8943,7 @@
           <p:cNvPr id="2" name="Title 1">
             <a:extLst>
               <a:ext uri="{FF2B5EF4-FFF2-40B4-BE49-F238E27FC236}">
-                <a16:creationId xmlns:a16="http://schemas.microsoft.com/office/drawing/2014/main" id="{179789F9-7351-4CC6-AA85-457B7B8BA729}"/>
+                <a16:creationId xmlns:a16="http://schemas.microsoft.com/office/drawing/2014/main" id="{B1CBD927-EA4E-414C-AD54-5A0FACAEDF00}"/>
               </a:ext>
             </a:extLst>
           </p:cNvPr>
@@ -6634,7 +8961,7 @@
           <a:p>
             <a:r>
               <a:rPr lang="nb-NO" dirty="0"/>
-              <a:t>Er Versjonskontroll bare for kode?</a:t>
+              <a:t>Git i Visual Studio</a:t>
             </a:r>
           </a:p>
         </p:txBody>
@@ -6644,7 +8971,7 @@
           <p:cNvPr id="3" name="Content Placeholder 2">
             <a:extLst>
               <a:ext uri="{FF2B5EF4-FFF2-40B4-BE49-F238E27FC236}">
-                <a16:creationId xmlns:a16="http://schemas.microsoft.com/office/drawing/2014/main" id="{D4F68470-CD0A-4284-849B-19E1AFC718F8}"/>
+                <a16:creationId xmlns:a16="http://schemas.microsoft.com/office/drawing/2014/main" id="{FF95AD81-2D86-4432-A2B9-A0B19D7E5BE5}"/>
               </a:ext>
             </a:extLst>
           </p:cNvPr>
@@ -6657,33 +8984,79 @@
         </p:nvSpPr>
         <p:spPr/>
         <p:txBody>
-          <a:bodyPr/>
+          <a:bodyPr>
+            <a:normAutofit fontScale="92500" lnSpcReduction="20000"/>
+          </a:bodyPr>
           <a:lstStyle/>
           <a:p>
             <a:r>
               <a:rPr lang="nb-NO" dirty="0"/>
-              <a:t>Nei</a:t>
-            </a:r>
-          </a:p>
-          <a:p>
+              <a:t>Visual Studio har integrert støtte for git (f.o.m. VS 2013)</a:t>
+            </a:r>
+          </a:p>
+          <a:p>
+            <a:pPr lvl="1"/>
             <a:r>
               <a:rPr lang="nb-NO" dirty="0"/>
-              <a:t>Versjonskontroll bør brukes på tvers av hele prosjektet</a:t>
+              <a:t>Branches</a:t>
             </a:r>
           </a:p>
           <a:p>
             <a:pPr lvl="1"/>
             <a:r>
               <a:rPr lang="nb-NO" dirty="0"/>
-              <a:t>Forhindrer spec.docx, spec_rev2.docx, spec_rev3.docs</a:t>
-            </a:r>
+              <a:t>Push, Pull</a:t>
+            </a:r>
+          </a:p>
+          <a:p>
+            <a:pPr lvl="1"/>
+            <a:r>
+              <a:rPr lang="nb-NO" dirty="0"/>
+              <a:t>Commit</a:t>
+            </a:r>
+          </a:p>
+          <a:p>
+            <a:pPr lvl="1"/>
+            <a:r>
+              <a:rPr lang="nb-NO" dirty="0"/>
+              <a:t>Merge</a:t>
+            </a:r>
+          </a:p>
+          <a:p>
+            <a:pPr lvl="1"/>
+            <a:r>
+              <a:rPr lang="nb-NO" dirty="0"/>
+              <a:t>History, Compare</a:t>
+            </a:r>
+          </a:p>
+          <a:p>
+            <a:pPr lvl="1"/>
+            <a:r>
+              <a:rPr lang="nb-NO" dirty="0"/>
+              <a:t>Code Lense-integrasjon</a:t>
+            </a:r>
+          </a:p>
+          <a:p>
+            <a:pPr marL="457200" lvl="1" indent="0">
+              <a:buNone/>
+            </a:pPr>
+            <a:endParaRPr lang="nb-NO" dirty="0"/>
+          </a:p>
+          <a:p>
+            <a:r>
+              <a:rPr lang="nb-NO" dirty="0"/>
+              <a:t>Visual Studio bruker git som standard kildekontroll ved opprettelse av nye prosjekter</a:t>
+            </a:r>
+          </a:p>
+          <a:p>
+            <a:endParaRPr lang="nb-NO" dirty="0"/>
           </a:p>
         </p:txBody>
       </p:sp>
     </p:spTree>
     <p:extLst>
       <p:ext uri="{BB962C8B-B14F-4D97-AF65-F5344CB8AC3E}">
-        <p14:creationId xmlns:p14="http://schemas.microsoft.com/office/powerpoint/2010/main" val="3137441122"/>
+        <p14:creationId xmlns:p14="http://schemas.microsoft.com/office/powerpoint/2010/main" val="2905875814"/>
       </p:ext>
     </p:extLst>
   </p:cSld>
@@ -6715,7 +9088,7 @@
           <p:cNvPr id="2" name="Title 1">
             <a:extLst>
               <a:ext uri="{FF2B5EF4-FFF2-40B4-BE49-F238E27FC236}">
-                <a16:creationId xmlns:a16="http://schemas.microsoft.com/office/drawing/2014/main" id="{489D62DE-12DF-4B41-BA25-26476ED97AE5}"/>
+                <a16:creationId xmlns:a16="http://schemas.microsoft.com/office/drawing/2014/main" id="{FAFD36D3-4DC7-4ED1-96C3-7A2E2F9E194A}"/>
               </a:ext>
             </a:extLst>
           </p:cNvPr>
@@ -6733,17 +9106,17 @@
           <a:p>
             <a:r>
               <a:rPr lang="nb-NO" dirty="0"/>
-              <a:t>Oppsummering</a:t>
-            </a:r>
-          </a:p>
-        </p:txBody>
-      </p:sp>
-      <p:sp>
-        <p:nvSpPr>
-          <p:cNvPr id="3" name="Text Placeholder 2">
+              <a:t>Andre Git-klienter</a:t>
+            </a:r>
+          </a:p>
+        </p:txBody>
+      </p:sp>
+      <p:sp>
+        <p:nvSpPr>
+          <p:cNvPr id="3" name="Content Placeholder 2">
             <a:extLst>
               <a:ext uri="{FF2B5EF4-FFF2-40B4-BE49-F238E27FC236}">
-                <a16:creationId xmlns:a16="http://schemas.microsoft.com/office/drawing/2014/main" id="{7A8B7547-AE02-4CCA-A854-442D6E0F19BC}"/>
+                <a16:creationId xmlns:a16="http://schemas.microsoft.com/office/drawing/2014/main" id="{1A1C14BF-CE39-43FA-9C4F-E4EF7CF63950}"/>
               </a:ext>
             </a:extLst>
           </p:cNvPr>
@@ -6751,38 +9124,15 @@
             <a:spLocks noGrp="1"/>
           </p:cNvSpPr>
           <p:nvPr>
-            <p:ph type="body" idx="1"/>
-          </p:nvPr>
-        </p:nvSpPr>
-        <p:spPr/>
-        <p:txBody>
-          <a:bodyPr/>
-          <a:lstStyle/>
-          <a:p>
-            <a:r>
-              <a:rPr lang="nb-NO" dirty="0"/>
-              <a:t>GIT</a:t>
-            </a:r>
-          </a:p>
-        </p:txBody>
-      </p:sp>
-      <p:sp>
-        <p:nvSpPr>
-          <p:cNvPr id="4" name="Content Placeholder 3">
-            <a:extLst>
-              <a:ext uri="{FF2B5EF4-FFF2-40B4-BE49-F238E27FC236}">
-                <a16:creationId xmlns:a16="http://schemas.microsoft.com/office/drawing/2014/main" id="{FD9FA60B-737A-475D-83AE-1863A98DF27F}"/>
-              </a:ext>
-            </a:extLst>
-          </p:cNvPr>
-          <p:cNvSpPr>
-            <a:spLocks noGrp="1"/>
-          </p:cNvSpPr>
-          <p:nvPr>
-            <p:ph sz="half" idx="2"/>
-          </p:nvPr>
-        </p:nvSpPr>
-        <p:spPr/>
+            <p:ph idx="1"/>
+          </p:nvPr>
+        </p:nvSpPr>
+        <p:spPr>
+          <a:xfrm>
+            <a:off x="1141413" y="2514599"/>
+            <a:ext cx="9905998" cy="4079147"/>
+          </a:xfrm>
+        </p:spPr>
         <p:txBody>
           <a:bodyPr>
             <a:normAutofit fontScale="92500" lnSpcReduction="20000"/>
@@ -6791,105 +9141,92 @@
           <a:p>
             <a:r>
               <a:rPr lang="nb-NO" dirty="0"/>
-              <a:t>Veldig bred støtte på tvers av verktøy og plattformer</a:t>
-            </a:r>
-          </a:p>
-          <a:p>
+              <a:t>De fleste andre IDE’er har </a:t>
+            </a:r>
+            <a:r>
+              <a:rPr lang="nb-NO" sz="2600" dirty="0"/>
+              <a:t>integrert</a:t>
+            </a:r>
             <a:r>
               <a:rPr lang="nb-NO" dirty="0"/>
-              <a:t>Bred støtte i andre verktøy/tjenester for Continuous Integration og Delivery</a:t>
-            </a:r>
-          </a:p>
-          <a:p>
+              <a:t> støtte for Git</a:t>
+            </a:r>
+          </a:p>
+          <a:p>
+            <a:pPr lvl="1"/>
             <a:r>
               <a:rPr lang="nb-NO" dirty="0"/>
-              <a:t>Utviklernes favoritt (kilde: StackOverflow, Google Trends)</a:t>
-            </a:r>
+              <a:t>VS Code, VS for Mac, Android Studio, Xcode, Eclipse, IntelliJ-baserte IDE’er</a:t>
+            </a:r>
+          </a:p>
+          <a:p>
+            <a:pPr marL="457200" lvl="1" indent="0">
+              <a:buNone/>
+            </a:pPr>
+            <a:endParaRPr lang="nb-NO" dirty="0"/>
           </a:p>
           <a:p>
             <a:r>
               <a:rPr lang="nb-NO" dirty="0"/>
-              <a:t>Microsoft omfavner Git</a:t>
+              <a:t>git – offisielt kommandolinjeverktøy (Windows, Mac og Linux)</a:t>
+            </a:r>
+          </a:p>
+          <a:p>
+            <a:r>
+              <a:rPr lang="nb-NO" dirty="0"/>
+              <a:t>git-gui – offisiell GUI-klient (Windows, Mac og Linux)</a:t>
+            </a:r>
+          </a:p>
+          <a:p>
+            <a:pPr marL="0" indent="0">
+              <a:buNone/>
+            </a:pPr>
+            <a:endParaRPr lang="nb-NO" dirty="0"/>
+          </a:p>
+          <a:p>
+            <a:r>
+              <a:rPr lang="nb-NO" dirty="0"/>
+              <a:t>Mange tredjepartsprogrammer med GUI</a:t>
             </a:r>
           </a:p>
           <a:p>
             <a:pPr lvl="1"/>
             <a:r>
               <a:rPr lang="nb-NO" dirty="0"/>
-              <a:t>Standard versjonskontroll i VS</a:t>
+              <a:t>GitKraken (Windows, Mac, Linux) (ANBEFALES!)</a:t>
             </a:r>
           </a:p>
           <a:p>
             <a:pPr lvl="1"/>
             <a:r>
               <a:rPr lang="nb-NO" dirty="0"/>
-              <a:t>Oppkjøp av GitHub</a:t>
-            </a:r>
-          </a:p>
-        </p:txBody>
-      </p:sp>
-      <p:sp>
-        <p:nvSpPr>
-          <p:cNvPr id="5" name="Text Placeholder 4">
-            <a:extLst>
-              <a:ext uri="{FF2B5EF4-FFF2-40B4-BE49-F238E27FC236}">
-                <a16:creationId xmlns:a16="http://schemas.microsoft.com/office/drawing/2014/main" id="{0BBDF59D-4500-4349-B4BB-C90659D60E4C}"/>
-              </a:ext>
-            </a:extLst>
-          </p:cNvPr>
-          <p:cNvSpPr>
-            <a:spLocks noGrp="1"/>
-          </p:cNvSpPr>
-          <p:nvPr>
-            <p:ph type="body" sz="quarter" idx="3"/>
-          </p:nvPr>
-        </p:nvSpPr>
-        <p:spPr/>
-        <p:txBody>
-          <a:bodyPr/>
-          <a:lstStyle/>
-          <a:p>
+              <a:t>SourceTree (Windows, Mac)</a:t>
+            </a:r>
+          </a:p>
+          <a:p>
+            <a:pPr lvl="1"/>
             <a:r>
               <a:rPr lang="nb-NO" dirty="0"/>
-              <a:t>TFS</a:t>
-            </a:r>
-          </a:p>
-        </p:txBody>
-      </p:sp>
-      <p:sp>
-        <p:nvSpPr>
-          <p:cNvPr id="6" name="Content Placeholder 5">
-            <a:extLst>
-              <a:ext uri="{FF2B5EF4-FFF2-40B4-BE49-F238E27FC236}">
-                <a16:creationId xmlns:a16="http://schemas.microsoft.com/office/drawing/2014/main" id="{755A7FCB-8E30-47E1-89E6-D6587AD8DCFA}"/>
-              </a:ext>
-            </a:extLst>
-          </p:cNvPr>
-          <p:cNvSpPr>
-            <a:spLocks noGrp="1"/>
-          </p:cNvSpPr>
-          <p:nvPr>
-            <p:ph sz="quarter" idx="4"/>
-          </p:nvPr>
-        </p:nvSpPr>
-        <p:spPr/>
-        <p:txBody>
-          <a:bodyPr>
-            <a:normAutofit fontScale="92500" lnSpcReduction="20000"/>
-          </a:bodyPr>
-          <a:lstStyle/>
-          <a:p>
+              <a:t>GitHub Desktop (Windows, Mac)</a:t>
+            </a:r>
+          </a:p>
+          <a:p>
+            <a:pPr lvl="1"/>
             <a:r>
               <a:rPr lang="nb-NO" dirty="0"/>
-              <a:t>?</a:t>
-            </a:r>
+              <a:t>++</a:t>
+            </a:r>
+          </a:p>
+          <a:p>
+            <a:pPr lvl="1"/>
+            <a:endParaRPr lang="nb-NO" dirty="0"/>
           </a:p>
         </p:txBody>
       </p:sp>
     </p:spTree>
     <p:extLst>
       <p:ext uri="{BB962C8B-B14F-4D97-AF65-F5344CB8AC3E}">
-        <p14:creationId xmlns:p14="http://schemas.microsoft.com/office/powerpoint/2010/main" val="1052008632"/>
+        <p14:creationId xmlns:p14="http://schemas.microsoft.com/office/powerpoint/2010/main" val="3041288103"/>
       </p:ext>
     </p:extLst>
   </p:cSld>
@@ -6921,7 +9258,7 @@
           <p:cNvPr id="2" name="Title 1">
             <a:extLst>
               <a:ext uri="{FF2B5EF4-FFF2-40B4-BE49-F238E27FC236}">
-                <a16:creationId xmlns:a16="http://schemas.microsoft.com/office/drawing/2014/main" id="{CEEE5B81-82A4-40F2-8ACF-867942429338}"/>
+                <a16:creationId xmlns:a16="http://schemas.microsoft.com/office/drawing/2014/main" id="{A31E238B-79DC-46FC-874A-ABD829766AFC}"/>
               </a:ext>
             </a:extLst>
           </p:cNvPr>
@@ -6938,65 +9275,102 @@
           <a:lstStyle/>
           <a:p>
             <a:r>
-              <a:rPr lang="nb-NO" cap="none" dirty="0"/>
-              <a:t>GitKraken - gitkraken.com</a:t>
-            </a:r>
-          </a:p>
-        </p:txBody>
-      </p:sp>
-      <p:pic>
-        <p:nvPicPr>
-          <p:cNvPr id="1026" name="Picture 2" descr="GitKraken gif">
+              <a:rPr lang="nb-NO" dirty="0"/>
+              <a:t>Git-Hosting</a:t>
+            </a:r>
+          </a:p>
+        </p:txBody>
+      </p:sp>
+      <p:sp>
+        <p:nvSpPr>
+          <p:cNvPr id="3" name="Content Placeholder 2">
             <a:extLst>
               <a:ext uri="{FF2B5EF4-FFF2-40B4-BE49-F238E27FC236}">
-                <a16:creationId xmlns:a16="http://schemas.microsoft.com/office/drawing/2014/main" id="{5199B85B-060B-4510-907D-CA615407F1E0}"/>
+                <a16:creationId xmlns:a16="http://schemas.microsoft.com/office/drawing/2014/main" id="{67570771-BA8F-449C-9729-AB92FB705E57}"/>
               </a:ext>
             </a:extLst>
           </p:cNvPr>
-          <p:cNvPicPr>
-            <a:picLocks noGrp="1" noChangeAspect="1" noChangeArrowheads="1" noCrop="1"/>
-          </p:cNvPicPr>
+          <p:cNvSpPr>
+            <a:spLocks noGrp="1"/>
+          </p:cNvSpPr>
           <p:nvPr>
             <p:ph idx="1"/>
           </p:nvPr>
-        </p:nvPicPr>
-        <p:blipFill>
-          <a:blip r:embed="rId2">
-            <a:extLst>
-              <a:ext uri="{28A0092B-C50C-407E-A947-70E740481C1C}">
-                <a14:useLocalDpi xmlns:a14="http://schemas.microsoft.com/office/drawing/2010/main" val="0"/>
-              </a:ext>
-            </a:extLst>
-          </a:blip>
-          <a:srcRect/>
-          <a:stretch>
-            <a:fillRect/>
-          </a:stretch>
-        </p:blipFill>
-        <p:spPr bwMode="auto">
+        </p:nvSpPr>
+        <p:spPr>
           <a:xfrm>
-            <a:off x="3317346" y="2667000"/>
-            <a:ext cx="5554133" cy="3124200"/>
+            <a:off x="1141413" y="2666999"/>
+            <a:ext cx="9905998" cy="3124201"/>
           </a:xfrm>
-          <a:prstGeom prst="rect">
-            <a:avLst/>
-          </a:prstGeom>
-          <a:noFill/>
-          <a:extLst>
-            <a:ext uri="{909E8E84-426E-40DD-AFC4-6F175D3DCCD1}">
-              <a14:hiddenFill xmlns:a14="http://schemas.microsoft.com/office/drawing/2010/main">
-                <a:solidFill>
-                  <a:srgbClr val="FFFFFF"/>
-                </a:solidFill>
-              </a14:hiddenFill>
-            </a:ext>
-          </a:extLst>
         </p:spPr>
-      </p:pic>
+        <p:txBody>
+          <a:bodyPr>
+            <a:normAutofit fontScale="85000" lnSpcReduction="20000"/>
+          </a:bodyPr>
+          <a:lstStyle/>
+          <a:p>
+            <a:r>
+              <a:rPr lang="nb-NO" dirty="0"/>
+              <a:t>GitHub</a:t>
+            </a:r>
+          </a:p>
+          <a:p>
+            <a:r>
+              <a:rPr lang="nb-NO" dirty="0"/>
+              <a:t>GitLab</a:t>
+            </a:r>
+          </a:p>
+          <a:p>
+            <a:r>
+              <a:rPr lang="nb-NO" dirty="0"/>
+              <a:t>BitBucket</a:t>
+            </a:r>
+          </a:p>
+          <a:p>
+            <a:r>
+              <a:rPr lang="nb-NO" dirty="0"/>
+              <a:t>VSTS (Azure DevOps)</a:t>
+            </a:r>
+          </a:p>
+          <a:p>
+            <a:endParaRPr lang="nb-NO" dirty="0"/>
+          </a:p>
+          <a:p>
+            <a:r>
+              <a:rPr lang="nb-NO" dirty="0"/>
+              <a:t>SaaS eller Enterprise-installasjon på egne servere</a:t>
+            </a:r>
+          </a:p>
+          <a:p>
+            <a:endParaRPr lang="nb-NO" dirty="0"/>
+          </a:p>
+          <a:p>
+            <a:r>
+              <a:rPr lang="nb-NO" dirty="0"/>
+              <a:t>CI – </a:t>
+            </a:r>
+            <a:r>
+              <a:rPr lang="nb-NO" dirty="0" err="1"/>
+              <a:t>Continuous</a:t>
+            </a:r>
+            <a:r>
+              <a:rPr lang="nb-NO" dirty="0"/>
+              <a:t> Integration</a:t>
+            </a:r>
+          </a:p>
+          <a:p>
+            <a:pPr lvl="1"/>
+            <a:r>
+              <a:rPr lang="nb-NO" dirty="0"/>
+              <a:t>De fleste tjenestene har også støtte for automatisk bygging, testing og publisering av prosjekter</a:t>
+            </a:r>
+          </a:p>
+        </p:txBody>
+      </p:sp>
     </p:spTree>
     <p:extLst>
       <p:ext uri="{BB962C8B-B14F-4D97-AF65-F5344CB8AC3E}">
-        <p14:creationId xmlns:p14="http://schemas.microsoft.com/office/powerpoint/2010/main" val="2143707724"/>
+        <p14:creationId xmlns:p14="http://schemas.microsoft.com/office/powerpoint/2010/main" val="3840197391"/>
       </p:ext>
     </p:extLst>
   </p:cSld>
@@ -7260,4 +9634,299 @@
     </a:ext>
   </a:extLst>
 </a:theme>
+</file>
+
+<file path=ppt/theme/theme2.xml><?xml version="1.0" encoding="utf-8"?>
+<a:theme xmlns:a="http://schemas.openxmlformats.org/drawingml/2006/main" name="Office Theme">
+  <a:themeElements>
+    <a:clrScheme name="Office">
+      <a:dk1>
+        <a:sysClr val="windowText" lastClr="000000"/>
+      </a:dk1>
+      <a:lt1>
+        <a:sysClr val="window" lastClr="FFFFFF"/>
+      </a:lt1>
+      <a:dk2>
+        <a:srgbClr val="44546A"/>
+      </a:dk2>
+      <a:lt2>
+        <a:srgbClr val="E7E6E6"/>
+      </a:lt2>
+      <a:accent1>
+        <a:srgbClr val="4472C4"/>
+      </a:accent1>
+      <a:accent2>
+        <a:srgbClr val="ED7D31"/>
+      </a:accent2>
+      <a:accent3>
+        <a:srgbClr val="A5A5A5"/>
+      </a:accent3>
+      <a:accent4>
+        <a:srgbClr val="FFC000"/>
+      </a:accent4>
+      <a:accent5>
+        <a:srgbClr val="5B9BD5"/>
+      </a:accent5>
+      <a:accent6>
+        <a:srgbClr val="70AD47"/>
+      </a:accent6>
+      <a:hlink>
+        <a:srgbClr val="0563C1"/>
+      </a:hlink>
+      <a:folHlink>
+        <a:srgbClr val="954F72"/>
+      </a:folHlink>
+    </a:clrScheme>
+    <a:fontScheme name="Office">
+      <a:majorFont>
+        <a:latin typeface="Calibri Light" panose="020F0302020204030204"/>
+        <a:ea typeface=""/>
+        <a:cs typeface=""/>
+        <a:font script="Jpan" typeface="游ゴシック Light"/>
+        <a:font script="Hang" typeface="맑은 고딕"/>
+        <a:font script="Hans" typeface="等线 Light"/>
+        <a:font script="Hant" typeface="新細明體"/>
+        <a:font script="Arab" typeface="Times New Roman"/>
+        <a:font script="Hebr" typeface="Times New Roman"/>
+        <a:font script="Thai" typeface="Angsana New"/>
+        <a:font script="Ethi" typeface="Nyala"/>
+        <a:font script="Beng" typeface="Vrinda"/>
+        <a:font script="Gujr" typeface="Shruti"/>
+        <a:font script="Khmr" typeface="MoolBoran"/>
+        <a:font script="Knda" typeface="Tunga"/>
+        <a:font script="Guru" typeface="Raavi"/>
+        <a:font script="Cans" typeface="Euphemia"/>
+        <a:font script="Cher" typeface="Plantagenet Cherokee"/>
+        <a:font script="Yiii" typeface="Microsoft Yi Baiti"/>
+        <a:font script="Tibt" typeface="Microsoft Himalaya"/>
+        <a:font script="Thaa" typeface="MV Boli"/>
+        <a:font script="Deva" typeface="Mangal"/>
+        <a:font script="Telu" typeface="Gautami"/>
+        <a:font script="Taml" typeface="Latha"/>
+        <a:font script="Syrc" typeface="Estrangelo Edessa"/>
+        <a:font script="Orya" typeface="Kalinga"/>
+        <a:font script="Mlym" typeface="Kartika"/>
+        <a:font script="Laoo" typeface="DokChampa"/>
+        <a:font script="Sinh" typeface="Iskoola Pota"/>
+        <a:font script="Mong" typeface="Mongolian Baiti"/>
+        <a:font script="Viet" typeface="Times New Roman"/>
+        <a:font script="Uigh" typeface="Microsoft Uighur"/>
+        <a:font script="Geor" typeface="Sylfaen"/>
+        <a:font script="Armn" typeface="Arial"/>
+        <a:font script="Bugi" typeface="Leelawadee UI"/>
+        <a:font script="Bopo" typeface="Microsoft JhengHei"/>
+        <a:font script="Java" typeface="Javanese Text"/>
+        <a:font script="Lisu" typeface="Segoe UI"/>
+        <a:font script="Mymr" typeface="Myanmar Text"/>
+        <a:font script="Nkoo" typeface="Ebrima"/>
+        <a:font script="Olck" typeface="Nirmala UI"/>
+        <a:font script="Osma" typeface="Ebrima"/>
+        <a:font script="Phag" typeface="Phagspa"/>
+        <a:font script="Syrn" typeface="Estrangelo Edessa"/>
+        <a:font script="Syrj" typeface="Estrangelo Edessa"/>
+        <a:font script="Syre" typeface="Estrangelo Edessa"/>
+        <a:font script="Sora" typeface="Nirmala UI"/>
+        <a:font script="Tale" typeface="Microsoft Tai Le"/>
+        <a:font script="Talu" typeface="Microsoft New Tai Lue"/>
+        <a:font script="Tfng" typeface="Ebrima"/>
+      </a:majorFont>
+      <a:minorFont>
+        <a:latin typeface="Calibri" panose="020F0502020204030204"/>
+        <a:ea typeface=""/>
+        <a:cs typeface=""/>
+        <a:font script="Jpan" typeface="游ゴシック"/>
+        <a:font script="Hang" typeface="맑은 고딕"/>
+        <a:font script="Hans" typeface="等线"/>
+        <a:font script="Hant" typeface="新細明體"/>
+        <a:font script="Arab" typeface="Arial"/>
+        <a:font script="Hebr" typeface="Arial"/>
+        <a:font script="Thai" typeface="Cordia New"/>
+        <a:font script="Ethi" typeface="Nyala"/>
+        <a:font script="Beng" typeface="Vrinda"/>
+        <a:font script="Gujr" typeface="Shruti"/>
+        <a:font script="Khmr" typeface="DaunPenh"/>
+        <a:font script="Knda" typeface="Tunga"/>
+        <a:font script="Guru" typeface="Raavi"/>
+        <a:font script="Cans" typeface="Euphemia"/>
+        <a:font script="Cher" typeface="Plantagenet Cherokee"/>
+        <a:font script="Yiii" typeface="Microsoft Yi Baiti"/>
+        <a:font script="Tibt" typeface="Microsoft Himalaya"/>
+        <a:font script="Thaa" typeface="MV Boli"/>
+        <a:font script="Deva" typeface="Mangal"/>
+        <a:font script="Telu" typeface="Gautami"/>
+        <a:font script="Taml" typeface="Latha"/>
+        <a:font script="Syrc" typeface="Estrangelo Edessa"/>
+        <a:font script="Orya" typeface="Kalinga"/>
+        <a:font script="Mlym" typeface="Kartika"/>
+        <a:font script="Laoo" typeface="DokChampa"/>
+        <a:font script="Sinh" typeface="Iskoola Pota"/>
+        <a:font script="Mong" typeface="Mongolian Baiti"/>
+        <a:font script="Viet" typeface="Arial"/>
+        <a:font script="Uigh" typeface="Microsoft Uighur"/>
+        <a:font script="Geor" typeface="Sylfaen"/>
+        <a:font script="Armn" typeface="Arial"/>
+        <a:font script="Bugi" typeface="Leelawadee UI"/>
+        <a:font script="Bopo" typeface="Microsoft JhengHei"/>
+        <a:font script="Java" typeface="Javanese Text"/>
+        <a:font script="Lisu" typeface="Segoe UI"/>
+        <a:font script="Mymr" typeface="Myanmar Text"/>
+        <a:font script="Nkoo" typeface="Ebrima"/>
+        <a:font script="Olck" typeface="Nirmala UI"/>
+        <a:font script="Osma" typeface="Ebrima"/>
+        <a:font script="Phag" typeface="Phagspa"/>
+        <a:font script="Syrn" typeface="Estrangelo Edessa"/>
+        <a:font script="Syrj" typeface="Estrangelo Edessa"/>
+        <a:font script="Syre" typeface="Estrangelo Edessa"/>
+        <a:font script="Sora" typeface="Nirmala UI"/>
+        <a:font script="Tale" typeface="Microsoft Tai Le"/>
+        <a:font script="Talu" typeface="Microsoft New Tai Lue"/>
+        <a:font script="Tfng" typeface="Ebrima"/>
+      </a:minorFont>
+    </a:fontScheme>
+    <a:fmtScheme name="Office">
+      <a:fillStyleLst>
+        <a:solidFill>
+          <a:schemeClr val="phClr"/>
+        </a:solidFill>
+        <a:gradFill rotWithShape="1">
+          <a:gsLst>
+            <a:gs pos="0">
+              <a:schemeClr val="phClr">
+                <a:lumMod val="110000"/>
+                <a:satMod val="105000"/>
+                <a:tint val="67000"/>
+              </a:schemeClr>
+            </a:gs>
+            <a:gs pos="50000">
+              <a:schemeClr val="phClr">
+                <a:lumMod val="105000"/>
+                <a:satMod val="103000"/>
+                <a:tint val="73000"/>
+              </a:schemeClr>
+            </a:gs>
+            <a:gs pos="100000">
+              <a:schemeClr val="phClr">
+                <a:lumMod val="105000"/>
+                <a:satMod val="109000"/>
+                <a:tint val="81000"/>
+              </a:schemeClr>
+            </a:gs>
+          </a:gsLst>
+          <a:lin ang="5400000" scaled="0"/>
+        </a:gradFill>
+        <a:gradFill rotWithShape="1">
+          <a:gsLst>
+            <a:gs pos="0">
+              <a:schemeClr val="phClr">
+                <a:satMod val="103000"/>
+                <a:lumMod val="102000"/>
+                <a:tint val="94000"/>
+              </a:schemeClr>
+            </a:gs>
+            <a:gs pos="50000">
+              <a:schemeClr val="phClr">
+                <a:satMod val="110000"/>
+                <a:lumMod val="100000"/>
+                <a:shade val="100000"/>
+              </a:schemeClr>
+            </a:gs>
+            <a:gs pos="100000">
+              <a:schemeClr val="phClr">
+                <a:lumMod val="99000"/>
+                <a:satMod val="120000"/>
+                <a:shade val="78000"/>
+              </a:schemeClr>
+            </a:gs>
+          </a:gsLst>
+          <a:lin ang="5400000" scaled="0"/>
+        </a:gradFill>
+      </a:fillStyleLst>
+      <a:lnStyleLst>
+        <a:ln w="6350" cap="flat" cmpd="sng" algn="ctr">
+          <a:solidFill>
+            <a:schemeClr val="phClr"/>
+          </a:solidFill>
+          <a:prstDash val="solid"/>
+          <a:miter lim="800000"/>
+        </a:ln>
+        <a:ln w="12700" cap="flat" cmpd="sng" algn="ctr">
+          <a:solidFill>
+            <a:schemeClr val="phClr"/>
+          </a:solidFill>
+          <a:prstDash val="solid"/>
+          <a:miter lim="800000"/>
+        </a:ln>
+        <a:ln w="19050" cap="flat" cmpd="sng" algn="ctr">
+          <a:solidFill>
+            <a:schemeClr val="phClr"/>
+          </a:solidFill>
+          <a:prstDash val="solid"/>
+          <a:miter lim="800000"/>
+        </a:ln>
+      </a:lnStyleLst>
+      <a:effectStyleLst>
+        <a:effectStyle>
+          <a:effectLst/>
+        </a:effectStyle>
+        <a:effectStyle>
+          <a:effectLst/>
+        </a:effectStyle>
+        <a:effectStyle>
+          <a:effectLst>
+            <a:outerShdw blurRad="57150" dist="19050" dir="5400000" algn="ctr" rotWithShape="0">
+              <a:srgbClr val="000000">
+                <a:alpha val="63000"/>
+              </a:srgbClr>
+            </a:outerShdw>
+          </a:effectLst>
+        </a:effectStyle>
+      </a:effectStyleLst>
+      <a:bgFillStyleLst>
+        <a:solidFill>
+          <a:schemeClr val="phClr"/>
+        </a:solidFill>
+        <a:solidFill>
+          <a:schemeClr val="phClr">
+            <a:tint val="95000"/>
+            <a:satMod val="170000"/>
+          </a:schemeClr>
+        </a:solidFill>
+        <a:gradFill rotWithShape="1">
+          <a:gsLst>
+            <a:gs pos="0">
+              <a:schemeClr val="phClr">
+                <a:tint val="93000"/>
+                <a:satMod val="150000"/>
+                <a:shade val="98000"/>
+                <a:lumMod val="102000"/>
+              </a:schemeClr>
+            </a:gs>
+            <a:gs pos="50000">
+              <a:schemeClr val="phClr">
+                <a:tint val="98000"/>
+                <a:satMod val="130000"/>
+                <a:shade val="90000"/>
+                <a:lumMod val="103000"/>
+              </a:schemeClr>
+            </a:gs>
+            <a:gs pos="100000">
+              <a:schemeClr val="phClr">
+                <a:shade val="63000"/>
+                <a:satMod val="120000"/>
+              </a:schemeClr>
+            </a:gs>
+          </a:gsLst>
+          <a:lin ang="5400000" scaled="0"/>
+        </a:gradFill>
+      </a:bgFillStyleLst>
+    </a:fmtScheme>
+  </a:themeElements>
+  <a:objectDefaults/>
+  <a:extraClrSchemeLst/>
+  <a:extLst>
+    <a:ext uri="{05A4C25C-085E-4340-85A3-A5531E510DB2}">
+      <thm15:themeFamily xmlns:thm15="http://schemas.microsoft.com/office/thememl/2012/main" name="Office Theme" id="{62F939B6-93AF-4DB8-9C6B-D6C7DFDC589F}" vid="{4A3C46E8-61CC-4603-A589-7422A47A8E4A}"/>
+    </a:ext>
+  </a:extLst>
+</a:theme>
 </file>
</xml_diff>